<commit_message>
Esempi ed esercizi del 28/04
</commit_message>
<xml_diff>
--- a/0000.MaterialeDidattico/Angular.pptx
+++ b/0000.MaterialeDidattico/Angular.pptx
@@ -230,7 +230,7 @@
             <a:fld id="{97A232E0-43F5-422F-BE89-3939B8A37B15}" type="datetimeFigureOut">
               <a:rPr lang="it-IT" smtClean="0"/>
               <a:pPr/>
-              <a:t>23/03/2025</a:t>
+              <a:t>28/04/2025</a:t>
             </a:fld>
             <a:endParaRPr lang="it-IT"/>
           </a:p>
@@ -949,7 +949,7 @@
             <a:fld id="{97A232E0-43F5-422F-BE89-3939B8A37B15}" type="datetimeFigureOut">
               <a:rPr lang="it-IT" smtClean="0"/>
               <a:pPr/>
-              <a:t>23/03/2025</a:t>
+              <a:t>28/04/2025</a:t>
             </a:fld>
             <a:endParaRPr lang="it-IT"/>
           </a:p>
@@ -1136,7 +1136,7 @@
             <a:fld id="{97A232E0-43F5-422F-BE89-3939B8A37B15}" type="datetimeFigureOut">
               <a:rPr lang="it-IT" smtClean="0"/>
               <a:pPr/>
-              <a:t>23/03/2025</a:t>
+              <a:t>28/04/2025</a:t>
             </a:fld>
             <a:endParaRPr lang="it-IT"/>
           </a:p>
@@ -1313,7 +1313,7 @@
             <a:fld id="{97A232E0-43F5-422F-BE89-3939B8A37B15}" type="datetimeFigureOut">
               <a:rPr lang="it-IT" smtClean="0"/>
               <a:pPr/>
-              <a:t>23/03/2025</a:t>
+              <a:t>28/04/2025</a:t>
             </a:fld>
             <a:endParaRPr lang="it-IT"/>
           </a:p>
@@ -2798,7 +2798,7 @@
             <a:fld id="{97A232E0-43F5-422F-BE89-3939B8A37B15}" type="datetimeFigureOut">
               <a:rPr lang="it-IT" smtClean="0"/>
               <a:pPr/>
-              <a:t>23/03/2025</a:t>
+              <a:t>28/04/2025</a:t>
             </a:fld>
             <a:endParaRPr lang="it-IT"/>
           </a:p>
@@ -3400,7 +3400,7 @@
             <a:fld id="{97A232E0-43F5-422F-BE89-3939B8A37B15}" type="datetimeFigureOut">
               <a:rPr lang="it-IT" smtClean="0"/>
               <a:pPr/>
-              <a:t>23/03/2025</a:t>
+              <a:t>28/04/2025</a:t>
             </a:fld>
             <a:endParaRPr lang="it-IT"/>
           </a:p>
@@ -3839,7 +3839,7 @@
             <a:fld id="{97A232E0-43F5-422F-BE89-3939B8A37B15}" type="datetimeFigureOut">
               <a:rPr lang="it-IT" smtClean="0"/>
               <a:pPr/>
-              <a:t>23/03/2025</a:t>
+              <a:t>28/04/2025</a:t>
             </a:fld>
             <a:endParaRPr lang="it-IT"/>
           </a:p>
@@ -4402,7 +4402,7 @@
             <a:fld id="{97A232E0-43F5-422F-BE89-3939B8A37B15}" type="datetimeFigureOut">
               <a:rPr lang="it-IT" smtClean="0"/>
               <a:pPr/>
-              <a:t>23/03/2025</a:t>
+              <a:t>28/04/2025</a:t>
             </a:fld>
             <a:endParaRPr lang="it-IT"/>
           </a:p>
@@ -4500,7 +4500,7 @@
             <a:fld id="{97A232E0-43F5-422F-BE89-3939B8A37B15}" type="datetimeFigureOut">
               <a:rPr lang="it-IT" smtClean="0"/>
               <a:pPr/>
-              <a:t>23/03/2025</a:t>
+              <a:t>28/04/2025</a:t>
             </a:fld>
             <a:endParaRPr lang="it-IT"/>
           </a:p>
@@ -4756,7 +4756,7 @@
             <a:fld id="{97A232E0-43F5-422F-BE89-3939B8A37B15}" type="datetimeFigureOut">
               <a:rPr lang="it-IT" smtClean="0"/>
               <a:pPr/>
-              <a:t>23/03/2025</a:t>
+              <a:t>28/04/2025</a:t>
             </a:fld>
             <a:endParaRPr lang="it-IT"/>
           </a:p>
@@ -5479,7 +5479,7 @@
             <a:fld id="{97A232E0-43F5-422F-BE89-3939B8A37B15}" type="datetimeFigureOut">
               <a:rPr lang="it-IT" smtClean="0"/>
               <a:pPr/>
-              <a:t>23/03/2025</a:t>
+              <a:t>28/04/2025</a:t>
             </a:fld>
             <a:endParaRPr lang="it-IT"/>
           </a:p>
@@ -6154,7 +6154,7 @@
             <a:fld id="{97A232E0-43F5-422F-BE89-3939B8A37B15}" type="datetimeFigureOut">
               <a:rPr lang="it-IT" smtClean="0"/>
               <a:pPr/>
-              <a:t>23/03/2025</a:t>
+              <a:t>28/04/2025</a:t>
             </a:fld>
             <a:endParaRPr lang="it-IT"/>
           </a:p>
@@ -6609,6 +6609,13 @@
   <p:clrMapOvr>
     <a:masterClrMapping/>
   </p:clrMapOvr>
+  <p:timing>
+    <p:tnLst>
+      <p:par>
+        <p:cTn id="1" dur="indefinite" restart="never" nodeType="tmRoot"/>
+      </p:par>
+    </p:tnLst>
+  </p:timing>
 </p:sld>
 </file>
 
@@ -6680,6 +6687,13 @@
   <p:clrMapOvr>
     <a:masterClrMapping/>
   </p:clrMapOvr>
+  <p:timing>
+    <p:tnLst>
+      <p:par>
+        <p:cTn id="1" dur="indefinite" restart="never" nodeType="tmRoot"/>
+      </p:par>
+    </p:tnLst>
+  </p:timing>
 </p:sld>
 </file>
 
@@ -6878,30 +6892,18 @@
           <a:p>
             <a:pPr lvl="2"/>
             <a:r>
-              <a:rPr lang="it-IT" dirty="0" smtClean="0"/>
-              <a:t>Erich Gamme, Richard </a:t>
-            </a:r>
-            <a:r>
-              <a:rPr lang="it-IT" dirty="0" err="1" smtClean="0"/>
-              <a:t>Helm</a:t>
-            </a:r>
-            <a:r>
-              <a:rPr lang="it-IT" dirty="0" smtClean="0"/>
-              <a:t>, Ralph </a:t>
-            </a:r>
-            <a:r>
-              <a:rPr lang="it-IT" dirty="0" err="1" smtClean="0"/>
-              <a:t>Helm</a:t>
-            </a:r>
-            <a:r>
-              <a:rPr lang="it-IT" dirty="0" smtClean="0"/>
-              <a:t>, John </a:t>
-            </a:r>
-            <a:r>
-              <a:rPr lang="it-IT" dirty="0" err="1" smtClean="0"/>
+              <a:rPr lang="en-US" dirty="0" smtClean="0"/>
+              <a:t>Erich Gamma, Richard Helm, Ralph Johnson, </a:t>
+            </a:r>
+            <a:r>
+              <a:rPr lang="en-US" dirty="0" smtClean="0"/>
+              <a:t>John </a:t>
+            </a:r>
+            <a:r>
+              <a:rPr lang="en-US" dirty="0" err="1" smtClean="0"/>
               <a:t>Vlissides</a:t>
             </a:r>
-            <a:endParaRPr lang="it-IT" dirty="0"/>
+            <a:endParaRPr lang="en-US" dirty="0" smtClean="0"/>
           </a:p>
           <a:p>
             <a:pPr lvl="2"/>
@@ -6918,7 +6920,15 @@
                   <a:srgbClr val="FF0000"/>
                 </a:solidFill>
               </a:rPr>
-              <a:t>https://refactoring.guru/design-patterns</a:t>
+              <a:t>https</a:t>
+            </a:r>
+            <a:r>
+              <a:rPr lang="it-IT" dirty="0" smtClean="0">
+                <a:solidFill>
+                  <a:srgbClr val="FF0000"/>
+                </a:solidFill>
+              </a:rPr>
+              <a:t>://refactoring.guru/design-patterns</a:t>
             </a:r>
             <a:endParaRPr lang="it-IT" dirty="0">
               <a:solidFill>
@@ -6933,6 +6943,13 @@
   <p:clrMapOvr>
     <a:masterClrMapping/>
   </p:clrMapOvr>
+  <p:timing>
+    <p:tnLst>
+      <p:par>
+        <p:cTn id="1" dur="indefinite" restart="never" nodeType="tmRoot"/>
+      </p:par>
+    </p:tnLst>
+  </p:timing>
 </p:sld>
 </file>
 
@@ -7140,6 +7157,22 @@
                   <a:srgbClr val="92D050"/>
                 </a:solidFill>
               </a:rPr>
+              <a:t> </a:t>
+            </a:r>
+            <a:r>
+              <a:rPr lang="it-IT" dirty="0" err="1" smtClean="0">
+                <a:solidFill>
+                  <a:srgbClr val="92D050"/>
+                </a:solidFill>
+              </a:rPr>
+              <a:t>template</a:t>
+            </a:r>
+            <a:r>
+              <a:rPr lang="it-IT" dirty="0" smtClean="0">
+                <a:solidFill>
+                  <a:srgbClr val="92D050"/>
+                </a:solidFill>
+              </a:rPr>
               <a:t>,</a:t>
             </a:r>
           </a:p>
@@ -7170,7 +7203,15 @@
                   <a:srgbClr val="92D050"/>
                 </a:solidFill>
               </a:rPr>
-              <a:t>Controller ↔ Classe di </a:t>
+              <a:t>Controller ↔ Classe </a:t>
+            </a:r>
+            <a:r>
+              <a:rPr lang="it-IT" dirty="0" smtClean="0">
+                <a:solidFill>
+                  <a:srgbClr val="92D050"/>
+                </a:solidFill>
+              </a:rPr>
+              <a:t>del componente (</a:t>
             </a:r>
             <a:r>
               <a:rPr lang="it-IT" dirty="0" err="1" smtClean="0">
@@ -7179,6 +7220,14 @@
                 </a:solidFill>
               </a:rPr>
               <a:t>code-behind</a:t>
+            </a:r>
+            <a:r>
+              <a:rPr lang="it-IT" dirty="0" smtClean="0">
+                <a:solidFill>
+                  <a:srgbClr val="92D050"/>
+                </a:solidFill>
+              </a:rPr>
+              <a:t>)</a:t>
             </a:r>
             <a:endParaRPr lang="it-IT" dirty="0">
               <a:solidFill>
@@ -7196,6 +7245,13 @@
   <p:clrMapOvr>
     <a:masterClrMapping/>
   </p:clrMapOvr>
+  <p:timing>
+    <p:tnLst>
+      <p:par>
+        <p:cTn id="1" dur="indefinite" restart="never" nodeType="tmRoot"/>
+      </p:par>
+    </p:tnLst>
+  </p:timing>
 </p:sld>
 </file>
 
@@ -7367,6 +7423,13 @@
   <p:clrMapOvr>
     <a:masterClrMapping/>
   </p:clrMapOvr>
+  <p:timing>
+    <p:tnLst>
+      <p:par>
+        <p:cTn id="1" dur="indefinite" restart="never" nodeType="tmRoot"/>
+      </p:par>
+    </p:tnLst>
+  </p:timing>
 </p:sld>
 </file>
 
@@ -7598,6 +7661,13 @@
   <p:clrMapOvr>
     <a:masterClrMapping/>
   </p:clrMapOvr>
+  <p:timing>
+    <p:tnLst>
+      <p:par>
+        <p:cTn id="1" dur="indefinite" restart="never" nodeType="tmRoot"/>
+      </p:par>
+    </p:tnLst>
+  </p:timing>
 </p:sld>
 </file>
 
@@ -7684,6 +7754,13 @@
   <p:clrMapOvr>
     <a:masterClrMapping/>
   </p:clrMapOvr>
+  <p:timing>
+    <p:tnLst>
+      <p:par>
+        <p:cTn id="1" dur="indefinite" restart="never" nodeType="tmRoot"/>
+      </p:par>
+    </p:tnLst>
+  </p:timing>
 </p:sld>
 </file>
 
@@ -7871,6 +7948,13 @@
   <p:clrMapOvr>
     <a:masterClrMapping/>
   </p:clrMapOvr>
+  <p:timing>
+    <p:tnLst>
+      <p:par>
+        <p:cTn id="1" dur="indefinite" restart="never" nodeType="tmRoot"/>
+      </p:par>
+    </p:tnLst>
+  </p:timing>
 </p:sld>
 </file>
 
@@ -8013,6 +8097,13 @@
   <p:clrMapOvr>
     <a:masterClrMapping/>
   </p:clrMapOvr>
+  <p:timing>
+    <p:tnLst>
+      <p:par>
+        <p:cTn id="1" dur="indefinite" restart="never" nodeType="tmRoot"/>
+      </p:par>
+    </p:tnLst>
+  </p:timing>
 </p:sld>
 </file>
 
@@ -8168,6 +8259,13 @@
   <p:clrMapOvr>
     <a:masterClrMapping/>
   </p:clrMapOvr>
+  <p:timing>
+    <p:tnLst>
+      <p:par>
+        <p:cTn id="1" dur="indefinite" restart="never" nodeType="tmRoot"/>
+      </p:par>
+    </p:tnLst>
+  </p:timing>
 </p:sld>
 </file>
 
@@ -8235,6 +8333,13 @@
   <p:clrMapOvr>
     <a:masterClrMapping/>
   </p:clrMapOvr>
+  <p:timing>
+    <p:tnLst>
+      <p:par>
+        <p:cTn id="1" dur="indefinite" restart="never" nodeType="tmRoot"/>
+      </p:par>
+    </p:tnLst>
+  </p:timing>
 </p:sld>
 </file>
 
@@ -8442,6 +8547,13 @@
   <p:clrMapOvr>
     <a:masterClrMapping/>
   </p:clrMapOvr>
+  <p:timing>
+    <p:tnLst>
+      <p:par>
+        <p:cTn id="1" dur="indefinite" restart="never" nodeType="tmRoot"/>
+      </p:par>
+    </p:tnLst>
+  </p:timing>
 </p:sld>
 </file>
 
@@ -8630,6 +8742,13 @@
   <p:clrMapOvr>
     <a:masterClrMapping/>
   </p:clrMapOvr>
+  <p:timing>
+    <p:tnLst>
+      <p:par>
+        <p:cTn id="1" dur="indefinite" restart="never" nodeType="tmRoot"/>
+      </p:par>
+    </p:tnLst>
+  </p:timing>
 </p:sld>
 </file>
 
@@ -8746,6 +8865,13 @@
   <p:clrMapOvr>
     <a:masterClrMapping/>
   </p:clrMapOvr>
+  <p:timing>
+    <p:tnLst>
+      <p:par>
+        <p:cTn id="1" dur="indefinite" restart="never" nodeType="tmRoot"/>
+      </p:par>
+    </p:tnLst>
+  </p:timing>
 </p:sld>
 </file>
 
@@ -8834,11 +8960,7 @@
             </a:r>
             <a:r>
               <a:rPr lang="it-IT" dirty="0" smtClean="0"/>
-              <a:t> è un frammento di HTML che definisce la vista di un </a:t>
-            </a:r>
-            <a:r>
-              <a:rPr lang="it-IT" dirty="0" smtClean="0"/>
-              <a:t>componente</a:t>
+              <a:t> è un frammento di HTML che definisce la vista di un componente</a:t>
             </a:r>
           </a:p>
           <a:p>
@@ -8853,11 +8975,7 @@
             </a:r>
             <a:r>
               <a:rPr lang="it-IT" dirty="0" smtClean="0"/>
-              <a:t>) alla vista (HTML</a:t>
-            </a:r>
-            <a:r>
-              <a:rPr lang="it-IT" dirty="0" smtClean="0"/>
-              <a:t>)</a:t>
+              <a:t>) alla vista (HTML)</a:t>
             </a:r>
           </a:p>
           <a:p>
@@ -8883,6 +9001,13 @@
   <p:clrMapOvr>
     <a:masterClrMapping/>
   </p:clrMapOvr>
+  <p:timing>
+    <p:tnLst>
+      <p:par>
+        <p:cTn id="1" dur="indefinite" restart="never" nodeType="tmRoot"/>
+      </p:par>
+    </p:tnLst>
+  </p:timing>
 </p:sld>
 </file>
 
@@ -8954,11 +9079,7 @@
           <a:p>
             <a:r>
               <a:rPr lang="it-IT" dirty="0" smtClean="0"/>
-              <a:t>Utilizza </a:t>
-            </a:r>
-            <a:r>
-              <a:rPr lang="it-IT" dirty="0" smtClean="0"/>
-              <a:t>le doppie parentesi graffe </a:t>
+              <a:t>Utilizza le doppie parentesi graffe </a:t>
             </a:r>
             <a:r>
               <a:rPr lang="it-IT" dirty="0" smtClean="0">
@@ -8967,16 +9088,7 @@
                 </a:solidFill>
                 <a:latin typeface="+mj-lt"/>
               </a:rPr>
-              <a:t>{{ </a:t>
-            </a:r>
-            <a:r>
-              <a:rPr lang="it-IT" dirty="0" smtClean="0">
-                <a:solidFill>
-                  <a:srgbClr val="92D050"/>
-                </a:solidFill>
-                <a:latin typeface="+mj-lt"/>
-              </a:rPr>
-              <a:t>}}</a:t>
+              <a:t>{{ }}</a:t>
             </a:r>
           </a:p>
           <a:p>
@@ -9115,6 +9227,13 @@
   <p:clrMapOvr>
     <a:masterClrMapping/>
   </p:clrMapOvr>
+  <p:timing>
+    <p:tnLst>
+      <p:par>
+        <p:cTn id="1" dur="indefinite" restart="never" nodeType="tmRoot"/>
+      </p:par>
+    </p:tnLst>
+  </p:timing>
 </p:sld>
 </file>
 
@@ -9203,13 +9322,8 @@
             </a:r>
             <a:r>
               <a:rPr lang="it-IT" dirty="0" smtClean="0"/>
-              <a:t> nella classe del </a:t>
-            </a:r>
-            <a:r>
-              <a:rPr lang="it-IT" dirty="0" smtClean="0"/>
-              <a:t>componente</a:t>
-            </a:r>
-            <a:endParaRPr lang="it-IT" dirty="0" smtClean="0"/>
+              <a:t> nella classe del componente</a:t>
+            </a:r>
           </a:p>
           <a:p>
             <a:pPr lvl="1"/>
@@ -9224,66 +9338,46 @@
                 </a:solidFill>
                 <a:latin typeface="+mj-lt"/>
               </a:rPr>
+              <a:t>{{ }}</a:t>
+            </a:r>
+          </a:p>
+          <a:p>
+            <a:pPr lvl="1"/>
+            <a:r>
+              <a:rPr lang="it-IT" dirty="0" smtClean="0"/>
+              <a:t>Sostituisce </a:t>
+            </a:r>
+            <a:r>
+              <a:rPr lang="it-IT" dirty="0" smtClean="0">
+                <a:solidFill>
+                  <a:srgbClr val="92D050"/>
+                </a:solidFill>
+                <a:latin typeface="+mj-lt"/>
+              </a:rPr>
               <a:t>{{ </a:t>
             </a:r>
             <a:r>
+              <a:rPr lang="it-IT" dirty="0" err="1" smtClean="0">
+                <a:solidFill>
+                  <a:srgbClr val="92D050"/>
+                </a:solidFill>
+                <a:latin typeface="+mj-lt"/>
+              </a:rPr>
+              <a:t>title</a:t>
+            </a:r>
+            <a:r>
               <a:rPr lang="it-IT" dirty="0" smtClean="0">
                 <a:solidFill>
                   <a:srgbClr val="92D050"/>
                 </a:solidFill>
                 <a:latin typeface="+mj-lt"/>
               </a:rPr>
-              <a:t>}}</a:t>
-            </a:r>
-            <a:endParaRPr lang="it-IT" dirty="0" smtClean="0">
-              <a:solidFill>
-                <a:srgbClr val="92D050"/>
-              </a:solidFill>
-              <a:latin typeface="+mj-lt"/>
-            </a:endParaRPr>
-          </a:p>
-          <a:p>
-            <a:pPr lvl="1"/>
-            <a:r>
-              <a:rPr lang="it-IT" dirty="0" smtClean="0"/>
-              <a:t>Sostituisce </a:t>
-            </a:r>
-            <a:r>
-              <a:rPr lang="it-IT" dirty="0" smtClean="0">
-                <a:solidFill>
-                  <a:srgbClr val="92D050"/>
-                </a:solidFill>
-                <a:latin typeface="+mj-lt"/>
-              </a:rPr>
-              <a:t>{{ </a:t>
-            </a:r>
-            <a:r>
-              <a:rPr lang="it-IT" dirty="0" err="1" smtClean="0">
-                <a:solidFill>
-                  <a:srgbClr val="92D050"/>
-                </a:solidFill>
-                <a:latin typeface="+mj-lt"/>
-              </a:rPr>
-              <a:t>title</a:t>
-            </a:r>
-            <a:r>
-              <a:rPr lang="it-IT" dirty="0" smtClean="0">
-                <a:solidFill>
-                  <a:srgbClr val="92D050"/>
-                </a:solidFill>
-                <a:latin typeface="+mj-lt"/>
-              </a:rPr>
               <a:t> }}</a:t>
             </a:r>
             <a:r>
               <a:rPr lang="it-IT" dirty="0" smtClean="0"/>
-              <a:t> con il valore della </a:t>
-            </a:r>
-            <a:r>
-              <a:rPr lang="it-IT" dirty="0" smtClean="0"/>
-              <a:t>proprietà</a:t>
-            </a:r>
-            <a:endParaRPr lang="it-IT" dirty="0" smtClean="0"/>
+              <a:t> con il valore della proprietà</a:t>
+            </a:r>
           </a:p>
           <a:p>
             <a:endParaRPr lang="it-IT" dirty="0"/>
@@ -9328,6 +9422,13 @@
   <p:clrMapOvr>
     <a:masterClrMapping/>
   </p:clrMapOvr>
+  <p:timing>
+    <p:tnLst>
+      <p:par>
+        <p:cTn id="1" dur="indefinite" restart="never" nodeType="tmRoot"/>
+      </p:par>
+    </p:tnLst>
+  </p:timing>
 </p:sld>
 </file>
 
@@ -9408,29 +9509,15 @@
             <a:pPr lvl="1"/>
             <a:r>
               <a:rPr lang="it-IT" dirty="0" smtClean="0"/>
-              <a:t>Proprietà della classe del </a:t>
-            </a:r>
-            <a:r>
-              <a:rPr lang="it-IT" dirty="0" smtClean="0"/>
-              <a:t>componente</a:t>
-            </a:r>
-            <a:endParaRPr lang="it-IT" dirty="0" smtClean="0"/>
+              <a:t>Proprietà della classe del componente</a:t>
+            </a:r>
           </a:p>
           <a:p>
             <a:pPr lvl="1"/>
             <a:r>
               <a:rPr lang="it-IT" dirty="0" smtClean="0"/>
-              <a:t>Chiamate a metodi </a:t>
-            </a:r>
-            <a:r>
-              <a:rPr lang="it-IT" dirty="0" smtClean="0"/>
-              <a:t>della classe del </a:t>
-            </a:r>
-            <a:r>
-              <a:rPr lang="it-IT" dirty="0" smtClean="0"/>
-              <a:t>componente che restituiscano informazioni da presentare</a:t>
-            </a:r>
-            <a:endParaRPr lang="it-IT" dirty="0" smtClean="0"/>
+              <a:t>Chiamate a metodi della classe del componente che restituiscano informazioni da presentare</a:t>
+            </a:r>
           </a:p>
           <a:p>
             <a:pPr lvl="1"/>
@@ -9444,26 +9531,14 @@
             </a:r>
             <a:r>
               <a:rPr lang="it-IT" dirty="0" smtClean="0"/>
-              <a:t> </a:t>
-            </a:r>
-            <a:r>
-              <a:rPr lang="it-IT" dirty="0" smtClean="0"/>
-              <a:t>semplici</a:t>
+              <a:t> semplici</a:t>
             </a:r>
           </a:p>
           <a:p>
             <a:pPr lvl="2"/>
             <a:r>
               <a:rPr lang="it-IT" dirty="0" smtClean="0"/>
-              <a:t>Es</a:t>
-            </a:r>
-            <a:r>
-              <a:rPr lang="it-IT" dirty="0" smtClean="0"/>
-              <a:t>. operazioni matematiche, concatenazione di </a:t>
-            </a:r>
-            <a:r>
-              <a:rPr lang="it-IT" dirty="0" smtClean="0"/>
-              <a:t>stringhe</a:t>
+              <a:t>Es. operazioni matematiche, concatenazione di stringhe</a:t>
             </a:r>
             <a:endParaRPr lang="it-IT" dirty="0"/>
           </a:p>
@@ -9507,6 +9582,13 @@
   <p:clrMapOvr>
     <a:masterClrMapping/>
   </p:clrMapOvr>
+  <p:timing>
+    <p:tnLst>
+      <p:par>
+        <p:cTn id="1" dur="indefinite" restart="never" nodeType="tmRoot"/>
+      </p:par>
+    </p:tnLst>
+  </p:timing>
 </p:sld>
 </file>
 
@@ -9571,7 +9653,15 @@
                   <a:srgbClr val="FF0000"/>
                 </a:solidFill>
               </a:rPr>
-              <a:t>Attenzione: </a:t>
+              <a:t>Attenzione: i metodi chiamati nell'interpolazione vengono eseguiti ad ogni ciclo di </a:t>
+            </a:r>
+            <a:r>
+              <a:rPr lang="it-IT" dirty="0" err="1" smtClean="0">
+                <a:solidFill>
+                  <a:srgbClr val="FF0000"/>
+                </a:solidFill>
+              </a:rPr>
+              <a:t>change</a:t>
             </a:r>
             <a:r>
               <a:rPr lang="it-IT" dirty="0" smtClean="0">
@@ -9579,39 +9669,7 @@
                   <a:srgbClr val="FF0000"/>
                 </a:solidFill>
               </a:rPr>
-              <a:t>i </a:t>
-            </a:r>
-            <a:r>
-              <a:rPr lang="it-IT" dirty="0" smtClean="0">
-                <a:solidFill>
-                  <a:srgbClr val="FF0000"/>
-                </a:solidFill>
-              </a:rPr>
-              <a:t>metodi chiamati nell'interpolazione vengono eseguiti ad ogni ciclo di </a:t>
-            </a:r>
-            <a:r>
-              <a:rPr lang="it-IT" dirty="0" err="1" smtClean="0">
-                <a:solidFill>
-                  <a:srgbClr val="FF0000"/>
-                </a:solidFill>
-              </a:rPr>
-              <a:t>change</a:t>
-            </a:r>
-            <a:r>
-              <a:rPr lang="it-IT" dirty="0" smtClean="0">
-                <a:solidFill>
-                  <a:srgbClr val="FF0000"/>
-                </a:solidFill>
-              </a:rPr>
-              <a:t> </a:t>
-            </a:r>
-            <a:r>
-              <a:rPr lang="it-IT" dirty="0" smtClean="0">
-                <a:solidFill>
-                  <a:srgbClr val="FF0000"/>
-                </a:solidFill>
-              </a:rPr>
-              <a:t>detection</a:t>
+              <a:t> detection</a:t>
             </a:r>
           </a:p>
           <a:p>
@@ -9692,6 +9750,13 @@
   <p:clrMapOvr>
     <a:masterClrMapping/>
   </p:clrMapOvr>
+  <p:timing>
+    <p:tnLst>
+      <p:par>
+        <p:cTn id="1" dur="indefinite" restart="never" nodeType="tmRoot"/>
+      </p:par>
+    </p:tnLst>
+  </p:timing>
 </p:sld>
 </file>
 
@@ -9796,6 +9861,13 @@
   <p:clrMapOvr>
     <a:masterClrMapping/>
   </p:clrMapOvr>
+  <p:timing>
+    <p:tnLst>
+      <p:par>
+        <p:cTn id="1" dur="indefinite" restart="never" nodeType="tmRoot"/>
+      </p:par>
+    </p:tnLst>
+  </p:timing>
 </p:sld>
 </file>
 
@@ -9904,6 +9976,13 @@
   <p:clrMapOvr>
     <a:masterClrMapping/>
   </p:clrMapOvr>
+  <p:timing>
+    <p:tnLst>
+      <p:par>
+        <p:cTn id="1" dur="indefinite" restart="never" nodeType="tmRoot"/>
+      </p:par>
+    </p:tnLst>
+  </p:timing>
 </p:sld>
 </file>
 
@@ -10008,6 +10087,13 @@
   <p:clrMapOvr>
     <a:masterClrMapping/>
   </p:clrMapOvr>
+  <p:timing>
+    <p:tnLst>
+      <p:par>
+        <p:cTn id="1" dur="indefinite" restart="never" nodeType="tmRoot"/>
+      </p:par>
+    </p:tnLst>
+  </p:timing>
 </p:sld>
 </file>
 
@@ -10188,6 +10274,13 @@
   <p:clrMapOvr>
     <a:masterClrMapping/>
   </p:clrMapOvr>
+  <p:timing>
+    <p:tnLst>
+      <p:par>
+        <p:cTn id="1" dur="indefinite" restart="never" nodeType="tmRoot"/>
+      </p:par>
+    </p:tnLst>
+  </p:timing>
 </p:sld>
 </file>
 
@@ -10326,6 +10419,13 @@
   <p:clrMapOvr>
     <a:masterClrMapping/>
   </p:clrMapOvr>
+  <p:timing>
+    <p:tnLst>
+      <p:par>
+        <p:cTn id="1" dur="indefinite" restart="never" nodeType="tmRoot"/>
+      </p:par>
+    </p:tnLst>
+  </p:timing>
 </p:sld>
 </file>
 
@@ -10400,22 +10500,14 @@
             <a:pPr lvl="1"/>
             <a:r>
               <a:rPr lang="it-IT" b="1" dirty="0" smtClean="0"/>
-              <a:t>Mantieni le espressioni </a:t>
-            </a:r>
-            <a:r>
-              <a:rPr lang="it-IT" b="1" dirty="0" smtClean="0"/>
-              <a:t>semplici</a:t>
+              <a:t>Mantieni le espressioni semplici</a:t>
             </a:r>
           </a:p>
           <a:p>
             <a:pPr lvl="2"/>
             <a:r>
               <a:rPr lang="it-IT" dirty="0" smtClean="0"/>
-              <a:t>Evita </a:t>
-            </a:r>
-            <a:r>
-              <a:rPr lang="it-IT" dirty="0" smtClean="0"/>
-              <a:t>logiche complesse nel </a:t>
+              <a:t>Evita logiche complesse nel </a:t>
             </a:r>
             <a:r>
               <a:rPr lang="it-IT" dirty="0" err="1" smtClean="0"/>
@@ -10437,34 +10529,20 @@
               <a:rPr lang="it-IT" dirty="0" smtClean="0"/>
               <a:t> serve solo per presentare le informazioni</a:t>
             </a:r>
-            <a:endParaRPr lang="it-IT" dirty="0" smtClean="0"/>
           </a:p>
           <a:p>
             <a:pPr lvl="1"/>
             <a:r>
               <a:rPr lang="it-IT" b="1" dirty="0" smtClean="0"/>
-              <a:t>Usa metodi con </a:t>
-            </a:r>
-            <a:r>
-              <a:rPr lang="it-IT" b="1" dirty="0" smtClean="0"/>
-              <a:t>cautela</a:t>
+              <a:t>Usa metodi con cautela</a:t>
             </a:r>
           </a:p>
           <a:p>
             <a:pPr lvl="2"/>
             <a:r>
               <a:rPr lang="it-IT" dirty="0" smtClean="0"/>
-              <a:t>I </a:t>
-            </a:r>
-            <a:r>
-              <a:rPr lang="it-IT" dirty="0" smtClean="0"/>
-              <a:t>metodi nell'interpolazione possono impattare le prestazioni se eseguiti </a:t>
-            </a:r>
-            <a:r>
-              <a:rPr lang="it-IT" dirty="0" smtClean="0"/>
-              <a:t>frequentemente</a:t>
-            </a:r>
-            <a:endParaRPr lang="it-IT" dirty="0" smtClean="0"/>
+              <a:t>I metodi nell'interpolazione possono impattare le prestazioni se eseguiti frequentemente</a:t>
+            </a:r>
           </a:p>
           <a:p>
             <a:pPr lvl="1"/>
@@ -10478,22 +10556,14 @@
             </a:r>
             <a:r>
               <a:rPr lang="it-IT" b="1" dirty="0" smtClean="0"/>
-              <a:t> di </a:t>
-            </a:r>
-            <a:r>
-              <a:rPr lang="it-IT" b="1" dirty="0" smtClean="0"/>
-              <a:t>proprietà</a:t>
+              <a:t> di proprietà</a:t>
             </a:r>
           </a:p>
           <a:p>
             <a:pPr lvl="2"/>
             <a:r>
               <a:rPr lang="it-IT" dirty="0" smtClean="0"/>
-              <a:t>Per </a:t>
-            </a:r>
-            <a:r>
-              <a:rPr lang="it-IT" dirty="0" smtClean="0"/>
-              <a:t>casi complessi, usa</a:t>
+              <a:t>Per casi complessi, usa</a:t>
             </a:r>
             <a:r>
               <a:rPr lang="it-IT" dirty="0" smtClean="0">
@@ -10522,12 +10592,6 @@
               </a:rPr>
               <a:t>]</a:t>
             </a:r>
-            <a:endParaRPr lang="it-IT" dirty="0" smtClean="0">
-              <a:solidFill>
-                <a:srgbClr val="92D050"/>
-              </a:solidFill>
-              <a:latin typeface="+mj-lt"/>
-            </a:endParaRPr>
           </a:p>
           <a:p>
             <a:endParaRPr lang="it-IT" dirty="0"/>
@@ -10539,6 +10603,13 @@
   <p:clrMapOvr>
     <a:masterClrMapping/>
   </p:clrMapOvr>
+  <p:timing>
+    <p:tnLst>
+      <p:par>
+        <p:cTn id="1" dur="indefinite" restart="never" nodeType="tmRoot"/>
+      </p:par>
+    </p:tnLst>
+  </p:timing>
 </p:sld>
 </file>
 
@@ -10620,7 +10691,6 @@
               <a:rPr lang="it-IT" b="1" dirty="0" smtClean="0"/>
               <a:t>Con lo scopo di mantenere sincronizzati i dati tra il componente e la vista in modo automatico</a:t>
             </a:r>
-            <a:endParaRPr lang="it-IT" b="1" dirty="0" smtClean="0"/>
           </a:p>
           <a:p>
             <a:r>
@@ -10814,6 +10884,13 @@
   <p:clrMapOvr>
     <a:masterClrMapping/>
   </p:clrMapOvr>
+  <p:timing>
+    <p:tnLst>
+      <p:par>
+        <p:cTn id="1" dur="indefinite" restart="never" nodeType="tmRoot"/>
+      </p:par>
+    </p:tnLst>
+  </p:timing>
 </p:sld>
 </file>
 
@@ -10896,11 +10973,7 @@
             <a:pPr lvl="1"/>
             <a:r>
               <a:rPr lang="it-IT" dirty="0" smtClean="0"/>
-              <a:t>Permette </a:t>
-            </a:r>
-            <a:r>
-              <a:rPr lang="it-IT" dirty="0" smtClean="0"/>
-              <a:t>di impostare il valore di una proprietà HTML o di una direttiva </a:t>
+              <a:t>Permette di impostare il valore di una proprietà HTML o di una direttiva </a:t>
             </a:r>
             <a:r>
               <a:rPr lang="it-IT" dirty="0" err="1" smtClean="0"/>
@@ -10908,13 +10981,8 @@
             </a:r>
             <a:r>
               <a:rPr lang="it-IT" dirty="0" smtClean="0"/>
-              <a:t> utilizzando i dati del </a:t>
-            </a:r>
-            <a:r>
-              <a:rPr lang="it-IT" dirty="0" smtClean="0"/>
-              <a:t>componente</a:t>
-            </a:r>
-            <a:endParaRPr lang="it-IT" dirty="0" smtClean="0"/>
+              <a:t> utilizzando i dati del componente</a:t>
+            </a:r>
           </a:p>
           <a:p>
             <a:pPr lvl="1"/>
@@ -10971,12 +11039,6 @@
               </a:rPr>
               <a:t>"</a:t>
             </a:r>
-            <a:endParaRPr lang="it-IT" dirty="0" smtClean="0">
-              <a:solidFill>
-                <a:srgbClr val="92D050"/>
-              </a:solidFill>
-              <a:latin typeface="+mj-lt"/>
-            </a:endParaRPr>
           </a:p>
           <a:p>
             <a:pPr lvl="1"/>
@@ -11090,23 +11152,8 @@
                 </a:solidFill>
                 <a:latin typeface="+mj-lt"/>
               </a:rPr>
-              <a:t> Logo</a:t>
-            </a:r>
-            <a:r>
-              <a:rPr lang="it-IT" sz="2000" dirty="0" smtClean="0">
-                <a:solidFill>
-                  <a:srgbClr val="92D050"/>
-                </a:solidFill>
-                <a:latin typeface="+mj-lt"/>
-              </a:rPr>
-              <a:t>"&gt;</a:t>
-            </a:r>
-            <a:endParaRPr lang="it-IT" sz="2000" dirty="0" smtClean="0">
-              <a:solidFill>
-                <a:srgbClr val="92D050"/>
-              </a:solidFill>
-              <a:latin typeface="+mj-lt"/>
-            </a:endParaRPr>
+              <a:t> Logo"&gt;</a:t>
+            </a:r>
           </a:p>
         </p:txBody>
       </p:sp>
@@ -11115,6 +11162,13 @@
   <p:clrMapOvr>
     <a:masterClrMapping/>
   </p:clrMapOvr>
+  <p:timing>
+    <p:tnLst>
+      <p:par>
+        <p:cTn id="1" dur="indefinite" restart="never" nodeType="tmRoot"/>
+      </p:par>
+    </p:tnLst>
+  </p:timing>
 </p:sld>
 </file>
 
@@ -11219,35 +11273,15 @@
                 </a:solidFill>
                 <a:latin typeface="+mj-lt"/>
               </a:rPr>
-              <a:t>[ </a:t>
-            </a:r>
-            <a:r>
-              <a:rPr lang="it-IT" dirty="0" smtClean="0">
-                <a:solidFill>
-                  <a:srgbClr val="92D050"/>
-                </a:solidFill>
-                <a:latin typeface="+mj-lt"/>
-              </a:rPr>
-              <a:t>]</a:t>
-            </a:r>
-            <a:endParaRPr lang="it-IT" dirty="0" smtClean="0">
-              <a:solidFill>
-                <a:srgbClr val="92D050"/>
-              </a:solidFill>
-              <a:latin typeface="+mj-lt"/>
-            </a:endParaRPr>
+              <a:t>[ ]</a:t>
+            </a:r>
           </a:p>
           <a:p>
             <a:pPr lvl="2"/>
             <a:r>
               <a:rPr lang="it-IT" dirty="0" smtClean="0"/>
-              <a:t>Aggiorna la proprietà HTML o la direttiva con il risultato </a:t>
-            </a:r>
-            <a:r>
-              <a:rPr lang="it-IT" dirty="0" smtClean="0"/>
-              <a:t>dell'espressione</a:t>
-            </a:r>
-            <a:endParaRPr lang="it-IT" dirty="0" smtClean="0"/>
+              <a:t>Aggiorna la proprietà HTML o la direttiva con il risultato dell'espressione</a:t>
+            </a:r>
           </a:p>
           <a:p>
             <a:pPr lvl="1"/>
@@ -11260,6 +11294,13 @@
   <p:clrMapOvr>
     <a:masterClrMapping/>
   </p:clrMapOvr>
+  <p:timing>
+    <p:tnLst>
+      <p:par>
+        <p:cTn id="1" dur="indefinite" restart="never" nodeType="tmRoot"/>
+      </p:par>
+    </p:tnLst>
+  </p:timing>
 </p:sld>
 </file>
 
@@ -11346,11 +11387,7 @@
             <a:pPr lvl="1"/>
             <a:r>
               <a:rPr lang="it-IT" dirty="0" smtClean="0"/>
-              <a:t>Collegamento </a:t>
-            </a:r>
-            <a:r>
-              <a:rPr lang="it-IT" dirty="0" smtClean="0"/>
-              <a:t>a </a:t>
+              <a:t>Collegamento a </a:t>
             </a:r>
             <a:r>
               <a:rPr lang="it-IT" dirty="0" err="1" smtClean="0"/>
@@ -11451,11 +11488,7 @@
             <a:pPr lvl="3"/>
             <a:r>
               <a:rPr lang="it-IT" dirty="0" smtClean="0"/>
-              <a:t>Se</a:t>
-            </a:r>
-            <a:r>
-              <a:rPr lang="it-IT" dirty="0" smtClean="0"/>
-              <a:t> </a:t>
+              <a:t>Se </a:t>
             </a:r>
             <a:r>
               <a:rPr lang="it-IT" dirty="0" err="1" smtClean="0">
@@ -11488,10 +11521,6 @@
               <a:rPr lang="it-IT" dirty="0" smtClean="0"/>
               <a:t>, il risultato sarà: </a:t>
             </a:r>
-            <a:r>
-              <a:rPr lang="it-IT" dirty="0" smtClean="0"/>
-              <a:t/>
-            </a:r>
             <a:br>
               <a:rPr lang="it-IT" dirty="0" smtClean="0"/>
             </a:br>
@@ -11576,12 +11605,6 @@
               </a:rPr>
               <a:t>&gt;</a:t>
             </a:r>
-            <a:endParaRPr lang="it-IT" sz="2000" dirty="0" smtClean="0">
-              <a:solidFill>
-                <a:srgbClr val="92D050"/>
-              </a:solidFill>
-              <a:latin typeface="+mj-lt"/>
-            </a:endParaRPr>
           </a:p>
           <a:p>
             <a:pPr lvl="1"/>
@@ -11601,7 +11624,16 @@
                 </a:solidFill>
                 <a:latin typeface="+mj-lt"/>
               </a:rPr>
-              <a:t>&lt;</a:t>
+              <a:t>&lt;p [</a:t>
+            </a:r>
+            <a:r>
+              <a:rPr lang="it-IT" sz="2000" dirty="0" err="1" smtClean="0">
+                <a:solidFill>
+                  <a:srgbClr val="92D050"/>
+                </a:solidFill>
+                <a:latin typeface="+mj-lt"/>
+              </a:rPr>
+              <a:t>style.color</a:t>
             </a:r>
             <a:r>
               <a:rPr lang="it-IT" sz="2000" dirty="0" smtClean="0">
@@ -11610,7 +11642,7 @@
                 </a:solidFill>
                 <a:latin typeface="+mj-lt"/>
               </a:rPr>
-              <a:t>p [</a:t>
+              <a:t>]="</a:t>
             </a:r>
             <a:r>
               <a:rPr lang="it-IT" sz="2000" dirty="0" err="1" smtClean="0">
@@ -11619,7 +11651,7 @@
                 </a:solidFill>
                 <a:latin typeface="+mj-lt"/>
               </a:rPr>
-              <a:t>style.color</a:t>
+              <a:t>textColor</a:t>
             </a:r>
             <a:r>
               <a:rPr lang="it-IT" sz="2000" dirty="0" smtClean="0">
@@ -11628,7 +11660,66 @@
                 </a:solidFill>
                 <a:latin typeface="+mj-lt"/>
               </a:rPr>
-              <a:t>]="</a:t>
+              <a:t>"&gt;Testo colorato&lt;/p&gt;</a:t>
+            </a:r>
+          </a:p>
+          <a:p>
+            <a:pPr lvl="3"/>
+            <a:r>
+              <a:rPr lang="it-IT" dirty="0" smtClean="0"/>
+              <a:t>Se </a:t>
+            </a:r>
+            <a:r>
+              <a:rPr lang="it-IT" dirty="0" err="1" smtClean="0">
+                <a:solidFill>
+                  <a:srgbClr val="92D050"/>
+                </a:solidFill>
+                <a:latin typeface="+mj-lt"/>
+              </a:rPr>
+              <a:t>textColor</a:t>
+            </a:r>
+            <a:r>
+              <a:rPr lang="it-IT" dirty="0" smtClean="0">
+                <a:solidFill>
+                  <a:srgbClr val="92D050"/>
+                </a:solidFill>
+                <a:latin typeface="+mj-lt"/>
+              </a:rPr>
+              <a:t> = '</a:t>
+            </a:r>
+            <a:r>
+              <a:rPr lang="it-IT" dirty="0" err="1" smtClean="0">
+                <a:solidFill>
+                  <a:srgbClr val="92D050"/>
+                </a:solidFill>
+                <a:latin typeface="+mj-lt"/>
+              </a:rPr>
+              <a:t>red</a:t>
+            </a:r>
+            <a:r>
+              <a:rPr lang="it-IT" dirty="0" smtClean="0">
+                <a:solidFill>
+                  <a:srgbClr val="92D050"/>
+                </a:solidFill>
+                <a:latin typeface="+mj-lt"/>
+              </a:rPr>
+              <a:t>'</a:t>
+            </a:r>
+            <a:r>
+              <a:rPr lang="it-IT" dirty="0" smtClean="0"/>
+              <a:t>, il risultato sarà: </a:t>
+            </a:r>
+            <a:br>
+              <a:rPr lang="it-IT" dirty="0" smtClean="0"/>
+            </a:br>
+            <a:r>
+              <a:rPr lang="it-IT" sz="2000" dirty="0" smtClean="0">
+                <a:solidFill>
+                  <a:srgbClr val="92D050"/>
+                </a:solidFill>
+                <a:latin typeface="+mj-lt"/>
+              </a:rPr>
+              <a:t>&lt;p </a:t>
             </a:r>
             <a:r>
               <a:rPr lang="it-IT" sz="2000" dirty="0" err="1" smtClean="0">
@@ -11637,7 +11728,7 @@
                 </a:solidFill>
                 <a:latin typeface="+mj-lt"/>
               </a:rPr>
-              <a:t>textColor</a:t>
+              <a:t>style=</a:t>
             </a:r>
             <a:r>
               <a:rPr lang="it-IT" sz="2000" dirty="0" smtClean="0">
@@ -11646,39 +11737,10 @@
                 </a:solidFill>
                 <a:latin typeface="+mj-lt"/>
               </a:rPr>
-              <a:t>"&gt;Testo colorato&lt;/p&gt;</a:t>
-            </a:r>
-          </a:p>
-          <a:p>
-            <a:pPr lvl="3"/>
-            <a:r>
-              <a:rPr lang="it-IT" dirty="0" smtClean="0"/>
-              <a:t>Se</a:t>
-            </a:r>
-            <a:r>
-              <a:rPr lang="it-IT" dirty="0" smtClean="0"/>
-              <a:t> </a:t>
-            </a:r>
-            <a:r>
-              <a:rPr lang="it-IT" dirty="0" err="1" smtClean="0">
-                <a:solidFill>
-                  <a:srgbClr val="92D050"/>
-                </a:solidFill>
-                <a:latin typeface="+mj-lt"/>
-              </a:rPr>
-              <a:t>textColor</a:t>
-            </a:r>
-            <a:r>
-              <a:rPr lang="it-IT" dirty="0" smtClean="0">
-                <a:solidFill>
-                  <a:srgbClr val="92D050"/>
-                </a:solidFill>
-                <a:latin typeface="+mj-lt"/>
-              </a:rPr>
-              <a:t> = '</a:t>
-            </a:r>
-            <a:r>
-              <a:rPr lang="it-IT" dirty="0" err="1" smtClean="0">
+              <a:t>"color: </a:t>
+            </a:r>
+            <a:r>
+              <a:rPr lang="it-IT" sz="2000" dirty="0" err="1" smtClean="0">
                 <a:solidFill>
                   <a:srgbClr val="92D050"/>
                 </a:solidFill>
@@ -11687,87 +11749,13 @@
               <a:t>red</a:t>
             </a:r>
             <a:r>
-              <a:rPr lang="it-IT" dirty="0" smtClean="0">
-                <a:solidFill>
-                  <a:srgbClr val="92D050"/>
-                </a:solidFill>
-                <a:latin typeface="+mj-lt"/>
-              </a:rPr>
-              <a:t>'</a:t>
-            </a:r>
-            <a:r>
-              <a:rPr lang="it-IT" dirty="0" smtClean="0"/>
-              <a:t>, il risultato sarà: </a:t>
-            </a:r>
-            <a:r>
-              <a:rPr lang="it-IT" dirty="0" smtClean="0"/>
-              <a:t/>
-            </a:r>
-            <a:br>
-              <a:rPr lang="it-IT" dirty="0" smtClean="0"/>
-            </a:br>
-            <a:r>
               <a:rPr lang="it-IT" sz="2000" dirty="0" smtClean="0">
                 <a:solidFill>
                   <a:srgbClr val="92D050"/>
                 </a:solidFill>
                 <a:latin typeface="+mj-lt"/>
               </a:rPr>
-              <a:t>&lt;</a:t>
-            </a:r>
-            <a:r>
-              <a:rPr lang="it-IT" sz="2000" dirty="0" smtClean="0">
-                <a:solidFill>
-                  <a:srgbClr val="92D050"/>
-                </a:solidFill>
-                <a:latin typeface="+mj-lt"/>
-              </a:rPr>
-              <a:t>p </a:t>
-            </a:r>
-            <a:r>
-              <a:rPr lang="it-IT" sz="2000" dirty="0" err="1" smtClean="0">
-                <a:solidFill>
-                  <a:srgbClr val="92D050"/>
-                </a:solidFill>
-                <a:latin typeface="+mj-lt"/>
-              </a:rPr>
-              <a:t>style=</a:t>
-            </a:r>
-            <a:r>
-              <a:rPr lang="it-IT" sz="2000" dirty="0" smtClean="0">
-                <a:solidFill>
-                  <a:srgbClr val="92D050"/>
-                </a:solidFill>
-                <a:latin typeface="+mj-lt"/>
-              </a:rPr>
-              <a:t>"color: </a:t>
-            </a:r>
-            <a:r>
-              <a:rPr lang="it-IT" sz="2000" dirty="0" err="1" smtClean="0">
-                <a:solidFill>
-                  <a:srgbClr val="92D050"/>
-                </a:solidFill>
-                <a:latin typeface="+mj-lt"/>
-              </a:rPr>
-              <a:t>red</a:t>
-            </a:r>
-            <a:r>
-              <a:rPr lang="it-IT" sz="2000" dirty="0" smtClean="0">
-                <a:solidFill>
-                  <a:srgbClr val="92D050"/>
-                </a:solidFill>
-                <a:latin typeface="+mj-lt"/>
-              </a:rPr>
-              <a:t>;"&gt;Testo colorato&lt;/p</a:t>
-            </a:r>
-            <a:r>
-              <a:rPr lang="it-IT" sz="2000" dirty="0" smtClean="0">
-                <a:solidFill>
-                  <a:srgbClr val="92D050"/>
-                </a:solidFill>
-                <a:latin typeface="+mj-lt"/>
-              </a:rPr>
-              <a:t>&gt;</a:t>
+              <a:t>;"&gt;Testo colorato&lt;/p&gt;</a:t>
             </a:r>
             <a:endParaRPr lang="it-IT" dirty="0" smtClean="0">
               <a:solidFill>
@@ -11786,6 +11774,13 @@
   <p:clrMapOvr>
     <a:masterClrMapping/>
   </p:clrMapOvr>
+  <p:timing>
+    <p:tnLst>
+      <p:par>
+        <p:cTn id="1" dur="indefinite" restart="never" nodeType="tmRoot"/>
+      </p:par>
+    </p:tnLst>
+  </p:timing>
 </p:sld>
 </file>
 
@@ -12027,10 +12022,46 @@
             <a:pPr lvl="3"/>
             <a:r>
               <a:rPr lang="it-IT" dirty="0" smtClean="0"/>
-              <a:t>Se</a:t>
-            </a:r>
-            <a:r>
-              <a:rPr lang="it-IT" dirty="0" smtClean="0"/>
+              <a:t>Se </a:t>
+            </a:r>
+            <a:r>
+              <a:rPr lang="it-IT" dirty="0" err="1" smtClean="0">
+                <a:solidFill>
+                  <a:srgbClr val="92D050"/>
+                </a:solidFill>
+                <a:latin typeface="+mj-lt"/>
+              </a:rPr>
+              <a:t>isActive</a:t>
+            </a:r>
+            <a:r>
+              <a:rPr lang="it-IT" dirty="0" smtClean="0">
+                <a:solidFill>
+                  <a:srgbClr val="92D050"/>
+                </a:solidFill>
+                <a:latin typeface="+mj-lt"/>
+              </a:rPr>
+              <a:t> = </a:t>
+            </a:r>
+            <a:r>
+              <a:rPr lang="it-IT" dirty="0" err="1" smtClean="0">
+                <a:solidFill>
+                  <a:srgbClr val="92D050"/>
+                </a:solidFill>
+                <a:latin typeface="+mj-lt"/>
+              </a:rPr>
+              <a:t>true</a:t>
+            </a:r>
+            <a:r>
+              <a:rPr lang="it-IT" dirty="0" smtClean="0"/>
+              <a:t> e</a:t>
+            </a:r>
+            <a:r>
+              <a:rPr lang="it-IT" dirty="0" smtClean="0">
+                <a:solidFill>
+                  <a:srgbClr val="92D050"/>
+                </a:solidFill>
+                <a:latin typeface="+mj-lt"/>
+              </a:rPr>
               <a:t> </a:t>
             </a:r>
             <a:r>
@@ -12040,7 +12071,7 @@
                 </a:solidFill>
                 <a:latin typeface="+mj-lt"/>
               </a:rPr>
-              <a:t>isActive</a:t>
+              <a:t>isDisabled</a:t>
             </a:r>
             <a:r>
               <a:rPr lang="it-IT" dirty="0" smtClean="0">
@@ -12049,7 +12080,23 @@
                 </a:solidFill>
                 <a:latin typeface="+mj-lt"/>
               </a:rPr>
-              <a:t> = </a:t>
+              <a:t> = false</a:t>
+            </a:r>
+            <a:r>
+              <a:rPr lang="it-IT" dirty="0" smtClean="0"/>
+              <a:t>, il risultato sarà: </a:t>
+            </a:r>
+            <a:br>
+              <a:rPr lang="it-IT" dirty="0" smtClean="0"/>
+            </a:br>
+            <a:r>
+              <a:rPr lang="it-IT" dirty="0" smtClean="0">
+                <a:solidFill>
+                  <a:srgbClr val="92D050"/>
+                </a:solidFill>
+                <a:latin typeface="+mj-lt"/>
+              </a:rPr>
+              <a:t>&lt;</a:t>
             </a:r>
             <a:r>
               <a:rPr lang="it-IT" dirty="0" err="1" smtClean="0">
@@ -12058,11 +12105,7 @@
                 </a:solidFill>
                 <a:latin typeface="+mj-lt"/>
               </a:rPr>
-              <a:t>true</a:t>
-            </a:r>
-            <a:r>
-              <a:rPr lang="it-IT" dirty="0" smtClean="0"/>
-              <a:t> e</a:t>
+              <a:t>div</a:t>
             </a:r>
             <a:r>
               <a:rPr lang="it-IT" dirty="0" smtClean="0">
@@ -12071,7 +12114,7 @@
                 </a:solidFill>
                 <a:latin typeface="+mj-lt"/>
               </a:rPr>
-              <a:t> </a:t>
+              <a:t> </a:t>
             </a:r>
             <a:r>
               <a:rPr lang="it-IT" dirty="0" err="1" smtClean="0">
@@ -12080,7 +12123,7 @@
                 </a:solidFill>
                 <a:latin typeface="+mj-lt"/>
               </a:rPr>
-              <a:t>isDisabled</a:t>
+              <a:t>class=</a:t>
             </a:r>
             <a:r>
               <a:rPr lang="it-IT" dirty="0" smtClean="0">
@@ -12089,19 +12132,17 @@
                 </a:solidFill>
                 <a:latin typeface="+mj-lt"/>
               </a:rPr>
-              <a:t> = false</a:t>
-            </a:r>
-            <a:r>
-              <a:rPr lang="it-IT" dirty="0" smtClean="0"/>
-              <a:t>, il risultato sarà: </a:t>
-            </a:r>
-            <a:r>
-              <a:rPr lang="it-IT" dirty="0" smtClean="0"/>
-              <a:t/>
-            </a:r>
-            <a:br>
-              <a:rPr lang="it-IT" dirty="0" smtClean="0"/>
-            </a:br>
+              <a:t>"</a:t>
+            </a:r>
+            <a:r>
+              <a:rPr lang="it-IT" dirty="0" err="1" smtClean="0">
+                <a:solidFill>
+                  <a:srgbClr val="92D050"/>
+                </a:solidFill>
+                <a:latin typeface="+mj-lt"/>
+              </a:rPr>
+              <a:t>active</a:t>
+            </a:r>
             <a:r>
               <a:rPr lang="it-IT" dirty="0" smtClean="0">
                 <a:solidFill>
@@ -12109,7 +12150,7 @@
                 </a:solidFill>
                 <a:latin typeface="+mj-lt"/>
               </a:rPr>
-              <a:t>&lt;</a:t>
+              <a:t>"&gt;Contenuto&lt;/</a:t>
             </a:r>
             <a:r>
               <a:rPr lang="it-IT" dirty="0" err="1" smtClean="0">
@@ -12127,68 +12168,8 @@
                 </a:solidFill>
                 <a:latin typeface="+mj-lt"/>
               </a:rPr>
-              <a:t> </a:t>
-            </a:r>
-            <a:r>
-              <a:rPr lang="it-IT" dirty="0" err="1" smtClean="0">
-                <a:solidFill>
-                  <a:srgbClr val="92D050"/>
-                </a:solidFill>
-                <a:latin typeface="+mj-lt"/>
-              </a:rPr>
-              <a:t>class=</a:t>
-            </a:r>
-            <a:r>
-              <a:rPr lang="it-IT" dirty="0" smtClean="0">
-                <a:solidFill>
-                  <a:srgbClr val="92D050"/>
-                </a:solidFill>
-                <a:latin typeface="+mj-lt"/>
-              </a:rPr>
-              <a:t>"</a:t>
-            </a:r>
-            <a:r>
-              <a:rPr lang="it-IT" dirty="0" err="1" smtClean="0">
-                <a:solidFill>
-                  <a:srgbClr val="92D050"/>
-                </a:solidFill>
-                <a:latin typeface="+mj-lt"/>
-              </a:rPr>
-              <a:t>active</a:t>
-            </a:r>
-            <a:r>
-              <a:rPr lang="it-IT" dirty="0" smtClean="0">
-                <a:solidFill>
-                  <a:srgbClr val="92D050"/>
-                </a:solidFill>
-                <a:latin typeface="+mj-lt"/>
-              </a:rPr>
-              <a:t>"&gt;Contenuto&lt;/</a:t>
-            </a:r>
-            <a:r>
-              <a:rPr lang="it-IT" dirty="0" err="1" smtClean="0">
-                <a:solidFill>
-                  <a:srgbClr val="92D050"/>
-                </a:solidFill>
-                <a:latin typeface="+mj-lt"/>
-              </a:rPr>
-              <a:t>div</a:t>
-            </a:r>
-            <a:r>
-              <a:rPr lang="it-IT" dirty="0" smtClean="0">
-                <a:solidFill>
-                  <a:srgbClr val="92D050"/>
-                </a:solidFill>
-                <a:latin typeface="+mj-lt"/>
-              </a:rPr>
               <a:t>&gt;</a:t>
             </a:r>
-            <a:endParaRPr lang="it-IT" dirty="0" smtClean="0">
-              <a:solidFill>
-                <a:srgbClr val="92D050"/>
-              </a:solidFill>
-              <a:latin typeface="+mj-lt"/>
-            </a:endParaRPr>
           </a:p>
           <a:p>
             <a:pPr lvl="1"/>
@@ -12212,7 +12193,16 @@
                 </a:solidFill>
                 <a:latin typeface="+mj-lt"/>
               </a:rPr>
-              <a:t>&lt;</a:t>
+              <a:t>&lt;p [</a:t>
+            </a:r>
+            <a:r>
+              <a:rPr lang="it-IT" sz="2200" dirty="0" err="1" smtClean="0">
+                <a:solidFill>
+                  <a:srgbClr val="92D050"/>
+                </a:solidFill>
+                <a:latin typeface="+mj-lt"/>
+              </a:rPr>
+              <a:t>ngStyle</a:t>
             </a:r>
             <a:r>
               <a:rPr lang="it-IT" sz="2200" dirty="0" smtClean="0">
@@ -12221,7 +12211,7 @@
                 </a:solidFill>
                 <a:latin typeface="+mj-lt"/>
               </a:rPr>
-              <a:t>p [</a:t>
+              <a:t>]="{'color': </a:t>
             </a:r>
             <a:r>
               <a:rPr lang="it-IT" sz="2200" dirty="0" err="1" smtClean="0">
@@ -12230,7 +12220,7 @@
                 </a:solidFill>
                 <a:latin typeface="+mj-lt"/>
               </a:rPr>
-              <a:t>ngStyle</a:t>
+              <a:t>textColor</a:t>
             </a:r>
             <a:r>
               <a:rPr lang="it-IT" sz="2200" dirty="0" smtClean="0">
@@ -12239,7 +12229,7 @@
                 </a:solidFill>
                 <a:latin typeface="+mj-lt"/>
               </a:rPr>
-              <a:t>]="{'color': </a:t>
+              <a:t>, '</a:t>
             </a:r>
             <a:r>
               <a:rPr lang="it-IT" sz="2200" dirty="0" err="1" smtClean="0">
@@ -12248,19 +12238,172 @@
                 </a:solidFill>
                 <a:latin typeface="+mj-lt"/>
               </a:rPr>
+              <a:t>font-size</a:t>
+            </a:r>
+            <a:r>
+              <a:rPr lang="it-IT" sz="2200" dirty="0" smtClean="0">
+                <a:solidFill>
+                  <a:srgbClr val="92D050"/>
+                </a:solidFill>
+                <a:latin typeface="+mj-lt"/>
+              </a:rPr>
+              <a:t>': </a:t>
+            </a:r>
+            <a:r>
+              <a:rPr lang="it-IT" sz="2200" dirty="0" err="1" smtClean="0">
+                <a:solidFill>
+                  <a:srgbClr val="92D050"/>
+                </a:solidFill>
+                <a:latin typeface="+mj-lt"/>
+              </a:rPr>
+              <a:t>fontSize</a:t>
+            </a:r>
+            <a:r>
+              <a:rPr lang="it-IT" sz="2200" dirty="0" smtClean="0">
+                <a:solidFill>
+                  <a:srgbClr val="92D050"/>
+                </a:solidFill>
+                <a:latin typeface="+mj-lt"/>
+              </a:rPr>
+              <a:t> + '</a:t>
+            </a:r>
+            <a:r>
+              <a:rPr lang="it-IT" sz="2200" dirty="0" err="1" smtClean="0">
+                <a:solidFill>
+                  <a:srgbClr val="92D050"/>
+                </a:solidFill>
+                <a:latin typeface="+mj-lt"/>
+              </a:rPr>
+              <a:t>px</a:t>
+            </a:r>
+            <a:r>
+              <a:rPr lang="it-IT" sz="2200" dirty="0" smtClean="0">
+                <a:solidFill>
+                  <a:srgbClr val="92D050"/>
+                </a:solidFill>
+                <a:latin typeface="+mj-lt"/>
+              </a:rPr>
+              <a:t>'}"&gt;Testo personalizzato&lt;/p&gt;</a:t>
+            </a:r>
+          </a:p>
+          <a:p>
+            <a:pPr lvl="3"/>
+            <a:r>
+              <a:rPr lang="it-IT" dirty="0" smtClean="0"/>
+              <a:t>Se </a:t>
+            </a:r>
+            <a:r>
+              <a:rPr lang="it-IT" dirty="0" err="1" smtClean="0">
+                <a:solidFill>
+                  <a:srgbClr val="92D050"/>
+                </a:solidFill>
+                <a:latin typeface="+mj-lt"/>
+              </a:rPr>
               <a:t>textColor</a:t>
             </a:r>
             <a:r>
-              <a:rPr lang="it-IT" sz="2200" dirty="0" smtClean="0">
-                <a:solidFill>
-                  <a:srgbClr val="92D050"/>
-                </a:solidFill>
-                <a:latin typeface="+mj-lt"/>
-              </a:rPr>
-              <a:t>, '</a:t>
-            </a:r>
-            <a:r>
-              <a:rPr lang="it-IT" sz="2200" dirty="0" err="1" smtClean="0">
+              <a:rPr lang="it-IT" dirty="0" smtClean="0">
+                <a:solidFill>
+                  <a:srgbClr val="92D050"/>
+                </a:solidFill>
+                <a:latin typeface="+mj-lt"/>
+              </a:rPr>
+              <a:t> = '</a:t>
+            </a:r>
+            <a:r>
+              <a:rPr lang="it-IT" dirty="0" err="1" smtClean="0">
+                <a:solidFill>
+                  <a:srgbClr val="92D050"/>
+                </a:solidFill>
+                <a:latin typeface="+mj-lt"/>
+              </a:rPr>
+              <a:t>blue</a:t>
+            </a:r>
+            <a:r>
+              <a:rPr lang="it-IT" dirty="0" smtClean="0">
+                <a:solidFill>
+                  <a:srgbClr val="92D050"/>
+                </a:solidFill>
+                <a:latin typeface="+mj-lt"/>
+              </a:rPr>
+              <a:t>' </a:t>
+            </a:r>
+            <a:r>
+              <a:rPr lang="it-IT" dirty="0" smtClean="0"/>
+              <a:t>e </a:t>
+            </a:r>
+            <a:r>
+              <a:rPr lang="it-IT" dirty="0" err="1" smtClean="0">
+                <a:solidFill>
+                  <a:srgbClr val="92D050"/>
+                </a:solidFill>
+                <a:latin typeface="+mj-lt"/>
+              </a:rPr>
+              <a:t>fontSize</a:t>
+            </a:r>
+            <a:r>
+              <a:rPr lang="it-IT" dirty="0" smtClean="0">
+                <a:solidFill>
+                  <a:srgbClr val="92D050"/>
+                </a:solidFill>
+                <a:latin typeface="+mj-lt"/>
+              </a:rPr>
+              <a:t> = 20</a:t>
+            </a:r>
+            <a:r>
+              <a:rPr lang="it-IT" dirty="0" smtClean="0"/>
+              <a:t>, il risultato sarà: </a:t>
+            </a:r>
+            <a:br>
+              <a:rPr lang="it-IT" dirty="0" smtClean="0"/>
+            </a:br>
+            <a:r>
+              <a:rPr lang="it-IT" sz="1900" dirty="0" smtClean="0">
+                <a:solidFill>
+                  <a:srgbClr val="92D050"/>
+                </a:solidFill>
+                <a:latin typeface="+mj-lt"/>
+              </a:rPr>
+              <a:t>&lt;p </a:t>
+            </a:r>
+            <a:r>
+              <a:rPr lang="it-IT" sz="1900" dirty="0" err="1" smtClean="0">
+                <a:solidFill>
+                  <a:srgbClr val="92D050"/>
+                </a:solidFill>
+                <a:latin typeface="+mj-lt"/>
+              </a:rPr>
+              <a:t>style=</a:t>
+            </a:r>
+            <a:r>
+              <a:rPr lang="it-IT" sz="1900" dirty="0" smtClean="0">
+                <a:solidFill>
+                  <a:srgbClr val="92D050"/>
+                </a:solidFill>
+                <a:latin typeface="+mj-lt"/>
+              </a:rPr>
+              <a:t>"color: </a:t>
+            </a:r>
+            <a:r>
+              <a:rPr lang="it-IT" sz="1900" dirty="0" err="1" smtClean="0">
+                <a:solidFill>
+                  <a:srgbClr val="92D050"/>
+                </a:solidFill>
+                <a:latin typeface="+mj-lt"/>
+              </a:rPr>
+              <a:t>blue</a:t>
+            </a:r>
+            <a:r>
+              <a:rPr lang="it-IT" sz="1900" dirty="0" smtClean="0">
+                <a:solidFill>
+                  <a:srgbClr val="92D050"/>
+                </a:solidFill>
+                <a:latin typeface="+mj-lt"/>
+              </a:rPr>
+              <a:t>; </a:t>
+            </a:r>
+            <a:r>
+              <a:rPr lang="it-IT" sz="1900" dirty="0" err="1" smtClean="0">
                 <a:solidFill>
                   <a:srgbClr val="92D050"/>
                 </a:solidFill>
@@ -12269,217 +12412,14 @@
               <a:t>font-size</a:t>
             </a:r>
             <a:r>
-              <a:rPr lang="it-IT" sz="2200" dirty="0" smtClean="0">
-                <a:solidFill>
-                  <a:srgbClr val="92D050"/>
-                </a:solidFill>
-                <a:latin typeface="+mj-lt"/>
-              </a:rPr>
-              <a:t>': </a:t>
-            </a:r>
-            <a:r>
-              <a:rPr lang="it-IT" sz="2200" dirty="0" err="1" smtClean="0">
-                <a:solidFill>
-                  <a:srgbClr val="92D050"/>
-                </a:solidFill>
-                <a:latin typeface="+mj-lt"/>
-              </a:rPr>
-              <a:t>fontSize</a:t>
-            </a:r>
-            <a:r>
-              <a:rPr lang="it-IT" sz="2200" dirty="0" smtClean="0">
-                <a:solidFill>
-                  <a:srgbClr val="92D050"/>
-                </a:solidFill>
-                <a:latin typeface="+mj-lt"/>
-              </a:rPr>
-              <a:t> + '</a:t>
-            </a:r>
-            <a:r>
-              <a:rPr lang="it-IT" sz="2200" dirty="0" err="1" smtClean="0">
-                <a:solidFill>
-                  <a:srgbClr val="92D050"/>
-                </a:solidFill>
-                <a:latin typeface="+mj-lt"/>
-              </a:rPr>
-              <a:t>px</a:t>
-            </a:r>
-            <a:r>
-              <a:rPr lang="it-IT" sz="2200" dirty="0" smtClean="0">
-                <a:solidFill>
-                  <a:srgbClr val="92D050"/>
-                </a:solidFill>
-                <a:latin typeface="+mj-lt"/>
-              </a:rPr>
-              <a:t>'}"&gt;Testo personalizzato&lt;/p&gt;</a:t>
-            </a:r>
-          </a:p>
-          <a:p>
-            <a:pPr lvl="3"/>
-            <a:r>
-              <a:rPr lang="it-IT" dirty="0" smtClean="0"/>
-              <a:t>Se</a:t>
-            </a:r>
-            <a:r>
-              <a:rPr lang="it-IT" dirty="0" smtClean="0"/>
-              <a:t> </a:t>
-            </a:r>
-            <a:r>
-              <a:rPr lang="it-IT" dirty="0" err="1" smtClean="0">
-                <a:solidFill>
-                  <a:srgbClr val="92D050"/>
-                </a:solidFill>
-                <a:latin typeface="+mj-lt"/>
-              </a:rPr>
-              <a:t>textColor</a:t>
-            </a:r>
-            <a:r>
-              <a:rPr lang="it-IT" dirty="0" smtClean="0">
-                <a:solidFill>
-                  <a:srgbClr val="92D050"/>
-                </a:solidFill>
-                <a:latin typeface="+mj-lt"/>
-              </a:rPr>
-              <a:t> = '</a:t>
-            </a:r>
-            <a:r>
-              <a:rPr lang="it-IT" dirty="0" err="1" smtClean="0">
-                <a:solidFill>
-                  <a:srgbClr val="92D050"/>
-                </a:solidFill>
-                <a:latin typeface="+mj-lt"/>
-              </a:rPr>
-              <a:t>blue</a:t>
-            </a:r>
-            <a:r>
-              <a:rPr lang="it-IT" dirty="0" smtClean="0">
-                <a:solidFill>
-                  <a:srgbClr val="92D050"/>
-                </a:solidFill>
-                <a:latin typeface="+mj-lt"/>
-              </a:rPr>
-              <a:t>' </a:t>
-            </a:r>
-            <a:r>
-              <a:rPr lang="it-IT" dirty="0" smtClean="0"/>
-              <a:t>e </a:t>
-            </a:r>
-            <a:r>
-              <a:rPr lang="it-IT" dirty="0" err="1" smtClean="0">
-                <a:solidFill>
-                  <a:srgbClr val="92D050"/>
-                </a:solidFill>
-                <a:latin typeface="+mj-lt"/>
-              </a:rPr>
-              <a:t>fontSize</a:t>
-            </a:r>
-            <a:r>
-              <a:rPr lang="it-IT" dirty="0" smtClean="0">
-                <a:solidFill>
-                  <a:srgbClr val="92D050"/>
-                </a:solidFill>
-                <a:latin typeface="+mj-lt"/>
-              </a:rPr>
-              <a:t> = 20</a:t>
-            </a:r>
-            <a:r>
-              <a:rPr lang="it-IT" dirty="0" smtClean="0"/>
-              <a:t>, il risultato sarà: </a:t>
-            </a:r>
-            <a:r>
-              <a:rPr lang="it-IT" dirty="0" smtClean="0"/>
-              <a:t/>
-            </a:r>
-            <a:br>
-              <a:rPr lang="it-IT" dirty="0" smtClean="0"/>
-            </a:br>
-            <a:r>
               <a:rPr lang="it-IT" sz="1900" dirty="0" smtClean="0">
                 <a:solidFill>
                   <a:srgbClr val="92D050"/>
                 </a:solidFill>
                 <a:latin typeface="+mj-lt"/>
               </a:rPr>
-              <a:t>&lt;</a:t>
-            </a:r>
-            <a:r>
-              <a:rPr lang="it-IT" sz="1900" dirty="0" smtClean="0">
-                <a:solidFill>
-                  <a:srgbClr val="92D050"/>
-                </a:solidFill>
-                <a:latin typeface="+mj-lt"/>
-              </a:rPr>
-              <a:t>p </a:t>
-            </a:r>
-            <a:r>
-              <a:rPr lang="it-IT" sz="1900" dirty="0" err="1" smtClean="0">
-                <a:solidFill>
-                  <a:srgbClr val="92D050"/>
-                </a:solidFill>
-                <a:latin typeface="+mj-lt"/>
-              </a:rPr>
-              <a:t>style=</a:t>
-            </a:r>
-            <a:r>
-              <a:rPr lang="it-IT" sz="1900" dirty="0" smtClean="0">
-                <a:solidFill>
-                  <a:srgbClr val="92D050"/>
-                </a:solidFill>
-                <a:latin typeface="+mj-lt"/>
-              </a:rPr>
-              <a:t>"color: </a:t>
-            </a:r>
-            <a:r>
-              <a:rPr lang="it-IT" sz="1900" dirty="0" err="1" smtClean="0">
-                <a:solidFill>
-                  <a:srgbClr val="92D050"/>
-                </a:solidFill>
-                <a:latin typeface="+mj-lt"/>
-              </a:rPr>
-              <a:t>blue</a:t>
-            </a:r>
-            <a:r>
-              <a:rPr lang="it-IT" sz="1900" dirty="0" smtClean="0">
-                <a:solidFill>
-                  <a:srgbClr val="92D050"/>
-                </a:solidFill>
-                <a:latin typeface="+mj-lt"/>
-              </a:rPr>
-              <a:t>; </a:t>
-            </a:r>
-            <a:r>
-              <a:rPr lang="it-IT" sz="1900" dirty="0" err="1" smtClean="0">
-                <a:solidFill>
-                  <a:srgbClr val="92D050"/>
-                </a:solidFill>
-                <a:latin typeface="+mj-lt"/>
-              </a:rPr>
-              <a:t>font-size</a:t>
-            </a:r>
-            <a:r>
-              <a:rPr lang="it-IT" sz="1900" dirty="0" smtClean="0">
-                <a:solidFill>
-                  <a:srgbClr val="92D050"/>
-                </a:solidFill>
-                <a:latin typeface="+mj-lt"/>
-              </a:rPr>
-              <a:t>: 20px;"&gt;Testo personalizzato&lt;/p</a:t>
-            </a:r>
-            <a:r>
-              <a:rPr lang="it-IT" sz="1900" dirty="0" smtClean="0">
-                <a:solidFill>
-                  <a:srgbClr val="92D050"/>
-                </a:solidFill>
-                <a:latin typeface="+mj-lt"/>
-              </a:rPr>
-              <a:t>&gt;</a:t>
-            </a:r>
-            <a:endParaRPr lang="it-IT" sz="1900" dirty="0" smtClean="0">
-              <a:solidFill>
-                <a:srgbClr val="92D050"/>
-              </a:solidFill>
-              <a:latin typeface="+mj-lt"/>
-            </a:endParaRPr>
+              <a:t>: 20px;"&gt;Testo personalizzato&lt;/p&gt;</a:t>
+            </a:r>
           </a:p>
           <a:p>
             <a:endParaRPr lang="it-IT" dirty="0"/>
@@ -12491,6 +12431,13 @@
   <p:clrMapOvr>
     <a:masterClrMapping/>
   </p:clrMapOvr>
+  <p:timing>
+    <p:tnLst>
+      <p:par>
+        <p:cTn id="1" dur="indefinite" restart="never" nodeType="tmRoot"/>
+      </p:par>
+    </p:tnLst>
+  </p:timing>
 </p:sld>
 </file>
 
@@ -12573,11 +12520,7 @@
             <a:pPr lvl="1"/>
             <a:r>
               <a:rPr lang="it-IT" dirty="0" smtClean="0"/>
-              <a:t>Permette </a:t>
-            </a:r>
-            <a:r>
-              <a:rPr lang="it-IT" dirty="0" smtClean="0"/>
-              <a:t>di reagire agli eventi del DOM (es. click, input, </a:t>
+              <a:t>Permette di reagire agli eventi del DOM (es. click, input, </a:t>
             </a:r>
             <a:r>
               <a:rPr lang="it-IT" dirty="0" err="1" smtClean="0"/>
@@ -12585,13 +12528,8 @@
             </a:r>
             <a:r>
               <a:rPr lang="it-IT" dirty="0" smtClean="0"/>
-              <a:t>) eseguendo metodi del </a:t>
-            </a:r>
-            <a:r>
-              <a:rPr lang="it-IT" dirty="0" smtClean="0"/>
-              <a:t>componente</a:t>
-            </a:r>
-            <a:endParaRPr lang="it-IT" dirty="0" smtClean="0"/>
+              <a:t>) eseguendo metodi del componente</a:t>
+            </a:r>
           </a:p>
           <a:p>
             <a:pPr lvl="1"/>
@@ -12648,12 +12586,6 @@
               </a:rPr>
               <a:t>"</a:t>
             </a:r>
-            <a:endParaRPr lang="it-IT" dirty="0" smtClean="0">
-              <a:solidFill>
-                <a:srgbClr val="92D050"/>
-              </a:solidFill>
-              <a:latin typeface="+mj-lt"/>
-            </a:endParaRPr>
           </a:p>
           <a:p>
             <a:pPr lvl="1"/>
@@ -12738,11 +12670,7 @@
             <a:pPr lvl="3"/>
             <a:r>
               <a:rPr lang="it-IT" dirty="0" smtClean="0"/>
-              <a:t>Quando </a:t>
-            </a:r>
-            <a:r>
-              <a:rPr lang="it-IT" dirty="0" smtClean="0"/>
-              <a:t>il pulsante viene cliccato, viene eseguito il metodo </a:t>
+              <a:t>Quando il pulsante viene cliccato, viene eseguito il metodo </a:t>
             </a:r>
             <a:r>
               <a:rPr lang="it-IT" dirty="0" err="1" smtClean="0">
@@ -12764,11 +12692,7 @@
             </a:r>
             <a:r>
               <a:rPr lang="it-IT" dirty="0" smtClean="0"/>
-              <a:t> del </a:t>
-            </a:r>
-            <a:r>
-              <a:rPr lang="it-IT" dirty="0" smtClean="0"/>
-              <a:t>componente</a:t>
+              <a:t> del componente</a:t>
             </a:r>
             <a:endParaRPr lang="it-IT" dirty="0"/>
           </a:p>
@@ -12779,6 +12703,13 @@
   <p:clrMapOvr>
     <a:masterClrMapping/>
   </p:clrMapOvr>
+  <p:timing>
+    <p:tnLst>
+      <p:par>
+        <p:cTn id="1" dur="indefinite" restart="never" nodeType="tmRoot"/>
+      </p:par>
+    </p:tnLst>
+  </p:timing>
 </p:sld>
 </file>
 
@@ -12867,27 +12798,14 @@
             </a:r>
             <a:r>
               <a:rPr lang="it-IT" dirty="0" smtClean="0"/>
-              <a:t> </a:t>
-            </a:r>
-            <a:r>
-              <a:rPr lang="it-IT" dirty="0" smtClean="0"/>
-              <a:t>ascolta l'evento specificato (es. click</a:t>
-            </a:r>
-            <a:r>
-              <a:rPr lang="it-IT" dirty="0" smtClean="0"/>
-              <a:t>)</a:t>
-            </a:r>
-            <a:endParaRPr lang="it-IT" dirty="0" smtClean="0"/>
+              <a:t> ascolta l'evento specificato (es. click)</a:t>
+            </a:r>
           </a:p>
           <a:p>
             <a:pPr lvl="1"/>
             <a:r>
               <a:rPr lang="it-IT" dirty="0" smtClean="0"/>
-              <a:t>Esegue l'espressione (es. chiamata di un metodo) quando l'evento si </a:t>
-            </a:r>
-            <a:r>
-              <a:rPr lang="it-IT" dirty="0" smtClean="0"/>
-              <a:t>verifica</a:t>
+              <a:t>Esegue l'espressione (es. chiamata di un metodo) quando l'evento si verifica</a:t>
             </a:r>
             <a:endParaRPr lang="it-IT" dirty="0"/>
           </a:p>
@@ -12931,6 +12849,13 @@
   <p:clrMapOvr>
     <a:masterClrMapping/>
   </p:clrMapOvr>
+  <p:timing>
+    <p:tnLst>
+      <p:par>
+        <p:cTn id="1" dur="indefinite" restart="never" nodeType="tmRoot"/>
+      </p:par>
+    </p:tnLst>
+  </p:timing>
 </p:sld>
 </file>
 
@@ -13096,15 +13021,7 @@
             <a:pPr lvl="1"/>
             <a:r>
               <a:rPr lang="it-IT" dirty="0" smtClean="0"/>
-              <a:t>Metodo </a:t>
-            </a:r>
-            <a:r>
-              <a:rPr lang="it-IT" dirty="0" smtClean="0"/>
-              <a:t>nel </a:t>
-            </a:r>
-            <a:r>
-              <a:rPr lang="it-IT" dirty="0" smtClean="0"/>
-              <a:t>componente </a:t>
+              <a:t>Metodo nel componente </a:t>
             </a:r>
             <a:r>
               <a:rPr lang="it-IT" dirty="0" err="1" smtClean="0"/>
@@ -13170,15 +13087,6 @@
               </a:rPr>
               <a:t>) </a:t>
             </a:r>
-            <a:r>
-              <a:rPr lang="it-IT" sz="2000" dirty="0" smtClean="0">
-                <a:solidFill>
-                  <a:srgbClr val="92D050"/>
-                </a:solidFill>
-                <a:latin typeface="+mj-lt"/>
-              </a:rPr>
-              <a:t/>
-            </a:r>
             <a:br>
               <a:rPr lang="it-IT" sz="2000" dirty="0" smtClean="0">
                 <a:solidFill>
@@ -13266,12 +13174,6 @@
               </a:rPr>
               <a:t>}</a:t>
             </a:r>
-            <a:endParaRPr lang="it-IT" sz="2000" dirty="0" smtClean="0">
-              <a:solidFill>
-                <a:srgbClr val="92D050"/>
-              </a:solidFill>
-              <a:latin typeface="+mj-lt"/>
-            </a:endParaRPr>
           </a:p>
           <a:p>
             <a:pPr lvl="3"/>
@@ -13294,16 +13196,7 @@
                 </a:solidFill>
                 <a:latin typeface="+mj-lt"/>
               </a:rPr>
-              <a:t>"Ciao</a:t>
-            </a:r>
-            <a:r>
-              <a:rPr lang="it-IT" dirty="0" smtClean="0">
-                <a:solidFill>
-                  <a:srgbClr val="92D050"/>
-                </a:solidFill>
-                <a:latin typeface="+mj-lt"/>
-              </a:rPr>
-              <a:t>"</a:t>
+              <a:t>"Ciao"</a:t>
             </a:r>
             <a:endParaRPr lang="it-IT" dirty="0">
               <a:solidFill>
@@ -13319,6 +13212,13 @@
   <p:clrMapOvr>
     <a:masterClrMapping/>
   </p:clrMapOvr>
+  <p:timing>
+    <p:tnLst>
+      <p:par>
+        <p:cTn id="1" dur="indefinite" restart="never" nodeType="tmRoot"/>
+      </p:par>
+    </p:tnLst>
+  </p:timing>
 </p:sld>
 </file>
 
@@ -13495,6 +13395,13 @@
   <p:clrMapOvr>
     <a:masterClrMapping/>
   </p:clrMapOvr>
+  <p:timing>
+    <p:tnLst>
+      <p:par>
+        <p:cTn id="1" dur="indefinite" restart="never" nodeType="tmRoot"/>
+      </p:par>
+    </p:tnLst>
+  </p:timing>
 </p:sld>
 </file>
 
@@ -13577,17 +13484,8 @@
             <a:pPr lvl="1"/>
             <a:r>
               <a:rPr lang="it-IT" dirty="0" smtClean="0"/>
-              <a:t>Permette </a:t>
-            </a:r>
-            <a:r>
-              <a:rPr lang="it-IT" dirty="0" smtClean="0"/>
-              <a:t>di sincronizzare i dati tra il componente e la vista in entrambe le </a:t>
-            </a:r>
-            <a:r>
-              <a:rPr lang="it-IT" dirty="0" smtClean="0"/>
-              <a:t>direzioni</a:t>
-            </a:r>
-            <a:endParaRPr lang="it-IT" dirty="0" smtClean="0"/>
+              <a:t>Permette di sincronizzare i dati tra il componente e la vista in entrambe le direzioni</a:t>
+            </a:r>
           </a:p>
           <a:p>
             <a:pPr lvl="1"/>
@@ -13644,12 +13542,6 @@
               </a:rPr>
               <a:t>"</a:t>
             </a:r>
-            <a:endParaRPr lang="it-IT" dirty="0" smtClean="0">
-              <a:solidFill>
-                <a:srgbClr val="92D050"/>
-              </a:solidFill>
-              <a:latin typeface="+mj-lt"/>
-            </a:endParaRPr>
           </a:p>
           <a:p>
             <a:pPr lvl="1"/>
@@ -13697,7 +13589,16 @@
                 </a:solidFill>
                 <a:latin typeface="+mj-lt"/>
               </a:rPr>
-              <a:t>&lt;</a:t>
+              <a:t>&lt;input [(</a:t>
+            </a:r>
+            <a:r>
+              <a:rPr lang="it-IT" sz="2000" dirty="0" err="1" smtClean="0">
+                <a:solidFill>
+                  <a:srgbClr val="92D050"/>
+                </a:solidFill>
+                <a:latin typeface="+mj-lt"/>
+              </a:rPr>
+              <a:t>ngModel</a:t>
             </a:r>
             <a:r>
               <a:rPr lang="it-IT" sz="2000" dirty="0" smtClean="0">
@@ -13706,7 +13607,7 @@
                 </a:solidFill>
                 <a:latin typeface="+mj-lt"/>
               </a:rPr>
-              <a:t>input [(</a:t>
+              <a:t>)]="username" </a:t>
             </a:r>
             <a:r>
               <a:rPr lang="it-IT" sz="2000" dirty="0" err="1" smtClean="0">
@@ -13715,7 +13616,7 @@
                 </a:solidFill>
                 <a:latin typeface="+mj-lt"/>
               </a:rPr>
-              <a:t>ngModel</a:t>
+              <a:t>placeholder=</a:t>
             </a:r>
             <a:r>
               <a:rPr lang="it-IT" sz="2000" dirty="0" smtClean="0">
@@ -13724,34 +13625,7 @@
                 </a:solidFill>
                 <a:latin typeface="+mj-lt"/>
               </a:rPr>
-              <a:t>)]="username" </a:t>
-            </a:r>
-            <a:r>
-              <a:rPr lang="it-IT" sz="2000" dirty="0" err="1" smtClean="0">
-                <a:solidFill>
-                  <a:srgbClr val="92D050"/>
-                </a:solidFill>
-                <a:latin typeface="+mj-lt"/>
-              </a:rPr>
-              <a:t>placeholder=</a:t>
-            </a:r>
-            <a:r>
-              <a:rPr lang="it-IT" sz="2000" dirty="0" smtClean="0">
-                <a:solidFill>
-                  <a:srgbClr val="92D050"/>
-                </a:solidFill>
-                <a:latin typeface="+mj-lt"/>
-              </a:rPr>
               <a:t>"Inserisci il nome"&gt; </a:t>
-            </a:r>
-            <a:r>
-              <a:rPr lang="it-IT" sz="2000" dirty="0" smtClean="0">
-                <a:solidFill>
-                  <a:srgbClr val="92D050"/>
-                </a:solidFill>
-                <a:latin typeface="+mj-lt"/>
-              </a:rPr>
-              <a:t/>
             </a:r>
             <a:br>
               <a:rPr lang="it-IT" sz="2000" dirty="0" smtClean="0">
@@ -13768,27 +13642,14 @@
                 </a:solidFill>
                 <a:latin typeface="+mj-lt"/>
               </a:rPr>
-              <a:t>&lt;</a:t>
-            </a:r>
-            <a:r>
-              <a:rPr lang="it-IT" sz="2000" dirty="0" smtClean="0">
-                <a:solidFill>
-                  <a:srgbClr val="92D050"/>
-                </a:solidFill>
-                <a:latin typeface="+mj-lt"/>
-              </a:rPr>
-              <a:t>p&gt;Il nome inserito è: {{ username }}&lt;/p&gt;</a:t>
+              <a:t>&lt;p&gt;Il nome inserito è: {{ username }}&lt;/p&gt;</a:t>
             </a:r>
           </a:p>
           <a:p>
             <a:pPr lvl="3"/>
             <a:r>
               <a:rPr lang="it-IT" dirty="0" smtClean="0"/>
-              <a:t>Se </a:t>
-            </a:r>
-            <a:r>
-              <a:rPr lang="it-IT" dirty="0" smtClean="0"/>
-              <a:t>l'utente digita </a:t>
+              <a:t>Se l'utente digita </a:t>
             </a:r>
             <a:r>
               <a:rPr lang="it-IT" dirty="0" smtClean="0">
@@ -13824,10 +13685,6 @@
               <a:rPr lang="it-IT" dirty="0" smtClean="0"/>
               <a:t> mostra: </a:t>
             </a:r>
-            <a:r>
-              <a:rPr lang="it-IT" dirty="0" smtClean="0"/>
-              <a:t/>
-            </a:r>
             <a:br>
               <a:rPr lang="it-IT" dirty="0" smtClean="0"/>
             </a:br>
@@ -13838,32 +13695,8 @@
                 </a:solidFill>
                 <a:latin typeface="+mj-lt"/>
               </a:rPr>
-              <a:t>&lt;</a:t>
-            </a:r>
-            <a:r>
-              <a:rPr lang="it-IT" dirty="0" smtClean="0">
-                <a:solidFill>
-                  <a:srgbClr val="92D050"/>
-                </a:solidFill>
-                <a:latin typeface="+mj-lt"/>
-              </a:rPr>
-              <a:t>p&gt;Il nome inserito è: Mario&lt;/p</a:t>
-            </a:r>
-            <a:r>
-              <a:rPr lang="it-IT" dirty="0" smtClean="0">
-                <a:solidFill>
-                  <a:srgbClr val="92D050"/>
-                </a:solidFill>
-                <a:latin typeface="+mj-lt"/>
-              </a:rPr>
-              <a:t>&gt;</a:t>
-            </a:r>
-            <a:endParaRPr lang="it-IT" dirty="0" smtClean="0">
-              <a:solidFill>
-                <a:srgbClr val="92D050"/>
-              </a:solidFill>
-              <a:latin typeface="+mj-lt"/>
-            </a:endParaRPr>
+              <a:t>&lt;p&gt;Il nome inserito è: Mario&lt;/p&gt;</a:t>
+            </a:r>
           </a:p>
           <a:p>
             <a:endParaRPr lang="it-IT" dirty="0"/>
@@ -13875,6 +13708,13 @@
   <p:clrMapOvr>
     <a:masterClrMapping/>
   </p:clrMapOvr>
+  <p:timing>
+    <p:tnLst>
+      <p:par>
+        <p:cTn id="1" dur="indefinite" restart="never" nodeType="tmRoot"/>
+      </p:par>
+    </p:tnLst>
+  </p:timing>
 </p:sld>
 </file>
 
@@ -13959,11 +13799,7 @@
             <a:pPr lvl="1"/>
             <a:r>
               <a:rPr lang="it-IT" dirty="0" smtClean="0"/>
-              <a:t>Aggiorna </a:t>
-            </a:r>
-            <a:r>
-              <a:rPr lang="it-IT" dirty="0" smtClean="0"/>
-              <a:t>la proprietà del componente quando l'input cambia (</a:t>
+              <a:t>Aggiorna la proprietà del componente quando l'input cambia (</a:t>
             </a:r>
             <a:r>
               <a:rPr lang="it-IT" dirty="0" err="1" smtClean="0"/>
@@ -13981,7 +13817,6 @@
               <a:rPr lang="it-IT" dirty="0" smtClean="0"/>
               <a:t>)</a:t>
             </a:r>
-            <a:endParaRPr lang="it-IT" dirty="0" smtClean="0"/>
           </a:p>
           <a:p>
             <a:pPr lvl="1"/>
@@ -14005,7 +13840,6 @@
               <a:rPr lang="it-IT" dirty="0" smtClean="0"/>
               <a:t>)</a:t>
             </a:r>
-            <a:endParaRPr lang="it-IT" dirty="0" smtClean="0"/>
           </a:p>
           <a:p>
             <a:endParaRPr lang="it-IT" dirty="0"/>
@@ -14017,6 +13851,13 @@
   <p:clrMapOvr>
     <a:masterClrMapping/>
   </p:clrMapOvr>
+  <p:timing>
+    <p:tnLst>
+      <p:par>
+        <p:cTn id="1" dur="indefinite" restart="never" nodeType="tmRoot"/>
+      </p:par>
+    </p:tnLst>
+  </p:timing>
 </p:sld>
 </file>
 
@@ -14109,13 +13950,8 @@
             </a:r>
             <a:r>
               <a:rPr lang="it-IT" dirty="0" smtClean="0"/>
-              <a:t> per impostare valori dinamici negli attributi </a:t>
-            </a:r>
-            <a:r>
-              <a:rPr lang="it-IT" dirty="0" smtClean="0"/>
-              <a:t>HTML</a:t>
-            </a:r>
-            <a:endParaRPr lang="it-IT" dirty="0" smtClean="0"/>
+              <a:t> per impostare valori dinamici negli attributi HTML</a:t>
+            </a:r>
           </a:p>
           <a:p>
             <a:pPr lvl="1"/>
@@ -14137,13 +13973,8 @@
             </a:r>
             <a:r>
               <a:rPr lang="it-IT" dirty="0" smtClean="0"/>
-              <a:t> per gestire le interazioni </a:t>
-            </a:r>
-            <a:r>
-              <a:rPr lang="it-IT" dirty="0" smtClean="0"/>
-              <a:t>dell'utente</a:t>
-            </a:r>
-            <a:endParaRPr lang="it-IT" dirty="0" smtClean="0"/>
+              <a:t> per gestire le interazioni dell'utente</a:t>
+            </a:r>
           </a:p>
           <a:p>
             <a:pPr lvl="1"/>
@@ -14165,26 +13996,14 @@
             </a:r>
             <a:r>
               <a:rPr lang="it-IT" dirty="0" smtClean="0"/>
-              <a:t> con </a:t>
-            </a:r>
-            <a:r>
-              <a:rPr lang="it-IT" dirty="0" smtClean="0"/>
-              <a:t>cautela</a:t>
+              <a:t> con cautela</a:t>
             </a:r>
           </a:p>
           <a:p>
             <a:pPr lvl="2"/>
             <a:r>
               <a:rPr lang="it-IT" dirty="0" smtClean="0"/>
-              <a:t>Perché può </a:t>
-            </a:r>
-            <a:r>
-              <a:rPr lang="it-IT" dirty="0" smtClean="0"/>
-              <a:t>rendere il flusso di dati meno prevedibile in applicazioni </a:t>
-            </a:r>
-            <a:r>
-              <a:rPr lang="it-IT" dirty="0" smtClean="0"/>
-              <a:t>complesse</a:t>
+              <a:t>Perché può rendere il flusso di dati meno prevedibile in applicazioni complesse</a:t>
             </a:r>
             <a:endParaRPr lang="it-IT" dirty="0"/>
           </a:p>
@@ -14195,6 +14014,13 @@
   <p:clrMapOvr>
     <a:masterClrMapping/>
   </p:clrMapOvr>
+  <p:timing>
+    <p:tnLst>
+      <p:par>
+        <p:cTn id="1" dur="indefinite" restart="never" nodeType="tmRoot"/>
+      </p:par>
+    </p:tnLst>
+  </p:timing>
 </p:sld>
 </file>
 
@@ -14358,6 +14184,13 @@
   <p:clrMapOvr>
     <a:masterClrMapping/>
   </p:clrMapOvr>
+  <p:timing>
+    <p:tnLst>
+      <p:par>
+        <p:cTn id="1" dur="indefinite" restart="never" nodeType="tmRoot"/>
+      </p:par>
+    </p:tnLst>
+  </p:timing>
 </p:sld>
 </file>
 
@@ -14434,13 +14267,8 @@
             </a:r>
             <a:r>
               <a:rPr lang="it-IT" dirty="0" smtClean="0"/>
-              <a:t>: Permette a un componente padre di passare dati a un componente </a:t>
-            </a:r>
-            <a:r>
-              <a:rPr lang="it-IT" dirty="0" smtClean="0"/>
-              <a:t>figlio</a:t>
-            </a:r>
-            <a:endParaRPr lang="it-IT" dirty="0" smtClean="0"/>
+              <a:t>: Permette a un componente padre di passare dati a un componente figlio</a:t>
+            </a:r>
           </a:p>
           <a:p>
             <a:pPr lvl="1"/>
@@ -14450,13 +14278,8 @@
             </a:r>
             <a:r>
               <a:rPr lang="it-IT" dirty="0" smtClean="0"/>
-              <a:t>: Permette a un componente figlio di inviare eventi al componente </a:t>
-            </a:r>
-            <a:r>
-              <a:rPr lang="it-IT" dirty="0" smtClean="0"/>
-              <a:t>padre</a:t>
-            </a:r>
-            <a:endParaRPr lang="it-IT" dirty="0" smtClean="0"/>
+              <a:t>: Permette a un componente figlio di inviare eventi al componente padre</a:t>
+            </a:r>
           </a:p>
           <a:p>
             <a:r>
@@ -14465,11 +14288,7 @@
             </a:r>
             <a:r>
               <a:rPr lang="it-IT" dirty="0" smtClean="0"/>
-              <a:t>: Creare componenti riutilizzabili e </a:t>
-            </a:r>
-            <a:r>
-              <a:rPr lang="it-IT" dirty="0" smtClean="0"/>
-              <a:t>modulari</a:t>
+              <a:t>: Creare componenti riutilizzabili e modulari</a:t>
             </a:r>
             <a:endParaRPr lang="it-IT" dirty="0"/>
           </a:p>
@@ -14480,6 +14299,13 @@
   <p:clrMapOvr>
     <a:masterClrMapping/>
   </p:clrMapOvr>
+  <p:timing>
+    <p:tnLst>
+      <p:par>
+        <p:cTn id="1" dur="indefinite" restart="never" nodeType="tmRoot"/>
+      </p:par>
+    </p:tnLst>
+  </p:timing>
 </p:sld>
 </file>
 
@@ -14542,11 +14368,7 @@
           <a:p>
             <a:r>
               <a:rPr lang="it-IT" dirty="0" smtClean="0"/>
-              <a:t>Si utilizza </a:t>
-            </a:r>
-            <a:r>
-              <a:rPr lang="it-IT" dirty="0" smtClean="0"/>
-              <a:t>il decoratore </a:t>
+              <a:t>Si utilizza il decoratore </a:t>
             </a:r>
             <a:r>
               <a:rPr lang="it-IT" dirty="0" err="1" smtClean="0"/>
@@ -14554,13 +14376,8 @@
             </a:r>
             <a:r>
               <a:rPr lang="it-IT" dirty="0" smtClean="0"/>
-              <a:t>() per definire una proprietà come </a:t>
-            </a:r>
-            <a:r>
-              <a:rPr lang="it-IT" dirty="0" smtClean="0"/>
-              <a:t>input</a:t>
-            </a:r>
-            <a:endParaRPr lang="it-IT" dirty="0" smtClean="0"/>
+              <a:t>() per definire una proprietà come input</a:t>
+            </a:r>
           </a:p>
           <a:p>
             <a:pPr lvl="1"/>
@@ -14582,16 +14399,7 @@
                 </a:solidFill>
                 <a:latin typeface="+mj-lt"/>
               </a:rPr>
-              <a:t>// </a:t>
-            </a:r>
-            <a:r>
-              <a:rPr lang="it-IT" sz="2000" dirty="0" smtClean="0">
-                <a:solidFill>
-                  <a:srgbClr val="92D050"/>
-                </a:solidFill>
-                <a:latin typeface="+mj-lt"/>
-              </a:rPr>
-              <a:t>Componente Figlio </a:t>
+              <a:t>// Componente Figlio </a:t>
             </a:r>
             <a:r>
               <a:rPr lang="it-IT" sz="2000" dirty="0" err="1" smtClean="0">
@@ -14664,15 +14472,6 @@
               </a:rPr>
               <a:t>', </a:t>
             </a:r>
-            <a:r>
-              <a:rPr lang="it-IT" sz="2000" dirty="0" smtClean="0">
-                <a:solidFill>
-                  <a:srgbClr val="92D050"/>
-                </a:solidFill>
-                <a:latin typeface="+mj-lt"/>
-              </a:rPr>
-              <a:t/>
-            </a:r>
             <a:br>
               <a:rPr lang="it-IT" sz="2000" dirty="0" smtClean="0">
                 <a:solidFill>
@@ -14717,15 +14516,6 @@
               </a:rPr>
               <a:t> }}&lt;/p&gt;` }) </a:t>
             </a:r>
-            <a:r>
-              <a:rPr lang="it-IT" sz="2000" dirty="0" smtClean="0">
-                <a:solidFill>
-                  <a:srgbClr val="92D050"/>
-                </a:solidFill>
-                <a:latin typeface="+mj-lt"/>
-              </a:rPr>
-              <a:t/>
-            </a:r>
             <a:br>
               <a:rPr lang="it-IT" sz="2000" dirty="0" smtClean="0">
                 <a:solidFill>
@@ -14779,15 +14569,6 @@
               </a:rPr>
               <a:t> { </a:t>
             </a:r>
-            <a:r>
-              <a:rPr lang="it-IT" sz="2000" dirty="0" smtClean="0">
-                <a:solidFill>
-                  <a:srgbClr val="92D050"/>
-                </a:solidFill>
-                <a:latin typeface="+mj-lt"/>
-              </a:rPr>
-              <a:t/>
-            </a:r>
             <a:br>
               <a:rPr lang="it-IT" sz="2000" dirty="0" smtClean="0">
                 <a:solidFill>
@@ -14803,7 +14584,16 @@
                 </a:solidFill>
                 <a:latin typeface="+mj-lt"/>
               </a:rPr>
-              <a:t>@</a:t>
+              <a:t>@Input</a:t>
+            </a:r>
+            <a:r>
+              <a:rPr lang="it-IT" sz="2000" dirty="0" smtClean="0">
+                <a:solidFill>
+                  <a:srgbClr val="92D050"/>
+                </a:solidFill>
+                <a:latin typeface="+mj-lt"/>
+              </a:rPr>
+              <a:t>() </a:t>
             </a:r>
             <a:r>
               <a:rPr lang="it-IT" sz="2000" dirty="0" err="1" smtClean="0">
@@ -14812,7 +14602,7 @@
                 </a:solidFill>
                 <a:latin typeface="+mj-lt"/>
               </a:rPr>
-              <a:t>Input</a:t>
+              <a:t>message</a:t>
             </a:r>
             <a:r>
               <a:rPr lang="it-IT" sz="2000" dirty="0" smtClean="0">
@@ -14821,7 +14611,7 @@
                 </a:solidFill>
                 <a:latin typeface="+mj-lt"/>
               </a:rPr>
-              <a:t>() </a:t>
+              <a:t>: </a:t>
             </a:r>
             <a:r>
               <a:rPr lang="it-IT" sz="2000" dirty="0" err="1" smtClean="0">
@@ -14830,7 +14620,7 @@
                 </a:solidFill>
                 <a:latin typeface="+mj-lt"/>
               </a:rPr>
-              <a:t>message</a:t>
+              <a:t>string</a:t>
             </a:r>
             <a:r>
               <a:rPr lang="it-IT" sz="2000" dirty="0" smtClean="0">
@@ -14839,34 +14629,7 @@
                 </a:solidFill>
                 <a:latin typeface="+mj-lt"/>
               </a:rPr>
-              <a:t>: </a:t>
-            </a:r>
-            <a:r>
-              <a:rPr lang="it-IT" sz="2000" dirty="0" err="1" smtClean="0">
-                <a:solidFill>
-                  <a:srgbClr val="92D050"/>
-                </a:solidFill>
-                <a:latin typeface="+mj-lt"/>
-              </a:rPr>
-              <a:t>string</a:t>
-            </a:r>
-            <a:r>
-              <a:rPr lang="it-IT" sz="2000" dirty="0" smtClean="0">
-                <a:solidFill>
-                  <a:srgbClr val="92D050"/>
-                </a:solidFill>
-                <a:latin typeface="+mj-lt"/>
-              </a:rPr>
               <a:t>; </a:t>
-            </a:r>
-            <a:r>
-              <a:rPr lang="it-IT" sz="2000" dirty="0" smtClean="0">
-                <a:solidFill>
-                  <a:srgbClr val="92D050"/>
-                </a:solidFill>
-                <a:latin typeface="+mj-lt"/>
-              </a:rPr>
-              <a:t/>
             </a:r>
             <a:br>
               <a:rPr lang="it-IT" sz="2000" dirty="0" smtClean="0">
@@ -14885,12 +14648,6 @@
               </a:rPr>
               <a:t>}</a:t>
             </a:r>
-            <a:endParaRPr lang="it-IT" sz="2000" dirty="0" smtClean="0">
-              <a:solidFill>
-                <a:srgbClr val="92D050"/>
-              </a:solidFill>
-              <a:latin typeface="+mj-lt"/>
-            </a:endParaRPr>
           </a:p>
           <a:p>
             <a:pPr lvl="2"/>
@@ -14919,7 +14676,16 @@
                 </a:solidFill>
                 <a:latin typeface="+mj-lt"/>
               </a:rPr>
-              <a:t> </a:t>
+              <a:t> Componente Padre </a:t>
+            </a:r>
+            <a:r>
+              <a:rPr lang="it-IT" sz="2000" dirty="0" err="1" smtClean="0">
+                <a:solidFill>
+                  <a:srgbClr val="92D050"/>
+                </a:solidFill>
+                <a:latin typeface="+mj-lt"/>
+              </a:rPr>
+              <a:t>--</a:t>
             </a:r>
             <a:r>
               <a:rPr lang="it-IT" sz="2000" dirty="0" smtClean="0">
@@ -14928,34 +14694,7 @@
                 </a:solidFill>
                 <a:latin typeface="+mj-lt"/>
               </a:rPr>
-              <a:t>Componente Padre </a:t>
-            </a:r>
-            <a:r>
-              <a:rPr lang="it-IT" sz="2000" dirty="0" err="1" smtClean="0">
-                <a:solidFill>
-                  <a:srgbClr val="92D050"/>
-                </a:solidFill>
-                <a:latin typeface="+mj-lt"/>
-              </a:rPr>
-              <a:t>--</a:t>
-            </a:r>
-            <a:r>
-              <a:rPr lang="it-IT" sz="2000" dirty="0" smtClean="0">
-                <a:solidFill>
-                  <a:srgbClr val="92D050"/>
-                </a:solidFill>
-                <a:latin typeface="+mj-lt"/>
-              </a:rPr>
               <a:t>&gt; </a:t>
-            </a:r>
-            <a:r>
-              <a:rPr lang="it-IT" sz="2000" dirty="0" smtClean="0">
-                <a:solidFill>
-                  <a:srgbClr val="92D050"/>
-                </a:solidFill>
-                <a:latin typeface="+mj-lt"/>
-              </a:rPr>
-              <a:t/>
             </a:r>
             <a:br>
               <a:rPr lang="it-IT" sz="2000" dirty="0" smtClean="0">
@@ -15051,11 +14790,7 @@
             <a:pPr lvl="3"/>
             <a:r>
               <a:rPr lang="it-IT" dirty="0" smtClean="0"/>
-              <a:t>Se</a:t>
-            </a:r>
-            <a:r>
-              <a:rPr lang="it-IT" dirty="0" smtClean="0"/>
-              <a:t> </a:t>
+              <a:t>Se </a:t>
             </a:r>
             <a:r>
               <a:rPr lang="it-IT" dirty="0" err="1" smtClean="0">
@@ -15086,23 +14821,8 @@
                 </a:solidFill>
                 <a:latin typeface="+mj-lt"/>
               </a:rPr>
-              <a:t>&lt;p&gt;Ciao dal padre&lt;/p</a:t>
-            </a:r>
-            <a:r>
-              <a:rPr lang="it-IT" dirty="0" smtClean="0">
-                <a:solidFill>
-                  <a:srgbClr val="92D050"/>
-                </a:solidFill>
-                <a:latin typeface="+mj-lt"/>
-              </a:rPr>
-              <a:t>&gt;</a:t>
-            </a:r>
-            <a:endParaRPr lang="it-IT" dirty="0" smtClean="0">
-              <a:solidFill>
-                <a:srgbClr val="92D050"/>
-              </a:solidFill>
-              <a:latin typeface="+mj-lt"/>
-            </a:endParaRPr>
+              <a:t>&lt;p&gt;Ciao dal padre&lt;/p&gt;</a:t>
+            </a:r>
           </a:p>
           <a:p>
             <a:endParaRPr lang="it-IT" dirty="0"/>
@@ -15114,6 +14834,13 @@
   <p:clrMapOvr>
     <a:masterClrMapping/>
   </p:clrMapOvr>
+  <p:timing>
+    <p:tnLst>
+      <p:par>
+        <p:cTn id="1" dur="indefinite" restart="never" nodeType="tmRoot"/>
+      </p:par>
+    </p:tnLst>
+  </p:timing>
 </p:sld>
 </file>
 
@@ -15195,13 +14922,8 @@
             </a:r>
             <a:r>
               <a:rPr lang="it-IT" dirty="0" smtClean="0"/>
-              <a:t> del componente </a:t>
-            </a:r>
-            <a:r>
-              <a:rPr lang="it-IT" dirty="0" smtClean="0"/>
-              <a:t>figlio</a:t>
-            </a:r>
-            <a:endParaRPr lang="it-IT" dirty="0" smtClean="0"/>
+              <a:t> del componente figlio</a:t>
+            </a:r>
           </a:p>
           <a:p>
             <a:pPr lvl="1"/>
@@ -15237,25 +14959,7 @@
                 </a:solidFill>
                 <a:latin typeface="+mj-lt"/>
               </a:rPr>
-              <a:t>// </a:t>
-            </a:r>
-            <a:r>
-              <a:rPr lang="it-IT" sz="1500" dirty="0" smtClean="0">
-                <a:solidFill>
-                  <a:srgbClr val="92D050"/>
-                </a:solidFill>
-                <a:latin typeface="+mj-lt"/>
-              </a:rPr>
-              <a:t>Componente Padre </a:t>
-            </a:r>
-            <a:r>
-              <a:rPr lang="it-IT" sz="1500" dirty="0" smtClean="0">
-                <a:solidFill>
-                  <a:srgbClr val="92D050"/>
-                </a:solidFill>
-                <a:latin typeface="+mj-lt"/>
-              </a:rPr>
-              <a:t/>
+              <a:t>// Componente Padre </a:t>
             </a:r>
             <a:br>
               <a:rPr lang="it-IT" sz="1500" dirty="0" smtClean="0">
@@ -15272,16 +14976,7 @@
                 </a:solidFill>
                 <a:latin typeface="+mj-lt"/>
               </a:rPr>
-              <a:t>@</a:t>
-            </a:r>
-            <a:r>
-              <a:rPr lang="it-IT" sz="1500" dirty="0" err="1" smtClean="0">
-                <a:solidFill>
-                  <a:srgbClr val="92D050"/>
-                </a:solidFill>
-                <a:latin typeface="+mj-lt"/>
-              </a:rPr>
-              <a:t>Component</a:t>
+              <a:t>@Component</a:t>
             </a:r>
             <a:r>
               <a:rPr lang="it-IT" sz="1500" dirty="0" smtClean="0">
@@ -15291,15 +14986,6 @@
                 <a:latin typeface="+mj-lt"/>
               </a:rPr>
               <a:t>({ </a:t>
-            </a:r>
-            <a:r>
-              <a:rPr lang="it-IT" sz="1500" dirty="0" smtClean="0">
-                <a:solidFill>
-                  <a:srgbClr val="92D050"/>
-                </a:solidFill>
-                <a:latin typeface="+mj-lt"/>
-              </a:rPr>
-              <a:t/>
             </a:r>
             <a:br>
               <a:rPr lang="it-IT" sz="1500" dirty="0" smtClean="0">
@@ -15345,15 +15031,6 @@
               </a:rPr>
               <a:t>', </a:t>
             </a:r>
-            <a:r>
-              <a:rPr lang="it-IT" sz="1500" dirty="0" smtClean="0">
-                <a:solidFill>
-                  <a:srgbClr val="92D050"/>
-                </a:solidFill>
-                <a:latin typeface="+mj-lt"/>
-              </a:rPr>
-              <a:t/>
-            </a:r>
             <a:br>
               <a:rPr lang="it-IT" sz="1500" dirty="0" smtClean="0">
                 <a:solidFill>
@@ -15452,15 +15129,6 @@
               </a:rPr>
               <a:t>&gt;` }) </a:t>
             </a:r>
-            <a:r>
-              <a:rPr lang="it-IT" sz="1500" dirty="0" smtClean="0">
-                <a:solidFill>
-                  <a:srgbClr val="92D050"/>
-                </a:solidFill>
-                <a:latin typeface="+mj-lt"/>
-              </a:rPr>
-              <a:t/>
-            </a:r>
             <a:br>
               <a:rPr lang="it-IT" sz="1500" dirty="0" smtClean="0">
                 <a:solidFill>
@@ -15514,15 +15182,6 @@
               </a:rPr>
               <a:t> { </a:t>
             </a:r>
-            <a:r>
-              <a:rPr lang="it-IT" sz="1500" dirty="0" smtClean="0">
-                <a:solidFill>
-                  <a:srgbClr val="92D050"/>
-                </a:solidFill>
-                <a:latin typeface="+mj-lt"/>
-              </a:rPr>
-              <a:t/>
-            </a:r>
             <a:br>
               <a:rPr lang="it-IT" sz="1500" dirty="0" smtClean="0">
                 <a:solidFill>
@@ -15556,25 +15215,7 @@
                 </a:solidFill>
                 <a:latin typeface="+mj-lt"/>
               </a:rPr>
-              <a:t> </a:t>
-            </a:r>
-            <a:r>
-              <a:rPr lang="it-IT" sz="1500" dirty="0" smtClean="0">
-                <a:solidFill>
-                  <a:srgbClr val="92D050"/>
-                </a:solidFill>
-                <a:latin typeface="+mj-lt"/>
-              </a:rPr>
-              <a:t>= 'Ciao dal padre'; </a:t>
-            </a:r>
-            <a:r>
-              <a:rPr lang="it-IT" sz="1500" dirty="0" smtClean="0">
-                <a:solidFill>
-                  <a:srgbClr val="92D050"/>
-                </a:solidFill>
-                <a:latin typeface="+mj-lt"/>
-              </a:rPr>
-              <a:t/>
+              <a:t> = 'Ciao dal padre'; </a:t>
             </a:r>
             <a:br>
               <a:rPr lang="it-IT" sz="1500" dirty="0" smtClean="0">
@@ -15593,24 +15234,13 @@
               </a:rPr>
               <a:t>}</a:t>
             </a:r>
-            <a:endParaRPr lang="it-IT" sz="1500" dirty="0" smtClean="0">
-              <a:solidFill>
-                <a:srgbClr val="92D050"/>
-              </a:solidFill>
-              <a:latin typeface="+mj-lt"/>
-            </a:endParaRPr>
           </a:p>
           <a:p>
             <a:pPr lvl="1"/>
             <a:r>
               <a:rPr lang="it-IT" dirty="0" smtClean="0"/>
-              <a:t>Risultato: Il componente figlio visualizza il messaggio passato dal </a:t>
-            </a:r>
-            <a:r>
-              <a:rPr lang="it-IT" dirty="0" smtClean="0"/>
-              <a:t>padre</a:t>
-            </a:r>
-            <a:endParaRPr lang="it-IT" dirty="0" smtClean="0"/>
+              <a:t>Risultato: Il componente figlio visualizza il messaggio passato dal padre</a:t>
+            </a:r>
           </a:p>
           <a:p>
             <a:endParaRPr lang="it-IT" dirty="0"/>
@@ -15622,6 +15252,13 @@
   <p:clrMapOvr>
     <a:masterClrMapping/>
   </p:clrMapOvr>
+  <p:timing>
+    <p:tnLst>
+      <p:par>
+        <p:cTn id="1" dur="indefinite" restart="never" nodeType="tmRoot"/>
+      </p:par>
+    </p:tnLst>
+  </p:timing>
 </p:sld>
 </file>
 
@@ -15684,11 +15321,7 @@
           <a:p>
             <a:r>
               <a:rPr lang="it-IT" b="1" dirty="0" smtClean="0"/>
-              <a:t>Passaggio </a:t>
-            </a:r>
-            <a:r>
-              <a:rPr lang="it-IT" b="1" dirty="0" smtClean="0"/>
-              <a:t>di oggetti</a:t>
+              <a:t>Passaggio di oggetti</a:t>
             </a:r>
             <a:r>
               <a:rPr lang="it-IT" dirty="0" smtClean="0"/>
@@ -15706,25 +15339,7 @@
                 </a:solidFill>
                 <a:latin typeface="+mj-lt"/>
               </a:rPr>
-              <a:t>// </a:t>
-            </a:r>
-            <a:r>
-              <a:rPr lang="it-IT" sz="1400" dirty="0" smtClean="0">
-                <a:solidFill>
-                  <a:srgbClr val="92D050"/>
-                </a:solidFill>
-                <a:latin typeface="+mj-lt"/>
-              </a:rPr>
-              <a:t>Componente Figlio </a:t>
-            </a:r>
-            <a:r>
-              <a:rPr lang="it-IT" sz="1400" dirty="0" smtClean="0">
-                <a:solidFill>
-                  <a:srgbClr val="92D050"/>
-                </a:solidFill>
-                <a:latin typeface="+mj-lt"/>
-              </a:rPr>
-              <a:t/>
+              <a:t>// Componente Figlio </a:t>
             </a:r>
             <a:br>
               <a:rPr lang="it-IT" sz="1400" dirty="0" smtClean="0">
@@ -15741,16 +15356,7 @@
                 </a:solidFill>
                 <a:latin typeface="+mj-lt"/>
               </a:rPr>
-              <a:t>@</a:t>
-            </a:r>
-            <a:r>
-              <a:rPr lang="it-IT" sz="1400" dirty="0" err="1" smtClean="0">
-                <a:solidFill>
-                  <a:srgbClr val="92D050"/>
-                </a:solidFill>
-                <a:latin typeface="+mj-lt"/>
-              </a:rPr>
-              <a:t>Component</a:t>
+              <a:t>@Component</a:t>
             </a:r>
             <a:r>
               <a:rPr lang="it-IT" sz="1400" dirty="0" smtClean="0">
@@ -15760,15 +15366,6 @@
                 <a:latin typeface="+mj-lt"/>
               </a:rPr>
               <a:t>({ </a:t>
-            </a:r>
-            <a:r>
-              <a:rPr lang="it-IT" sz="1400" dirty="0" smtClean="0">
-                <a:solidFill>
-                  <a:srgbClr val="92D050"/>
-                </a:solidFill>
-                <a:latin typeface="+mj-lt"/>
-              </a:rPr>
-              <a:t/>
             </a:r>
             <a:br>
               <a:rPr lang="it-IT" sz="1400" dirty="0" smtClean="0">
@@ -15814,15 +15411,6 @@
               </a:rPr>
               <a:t>', </a:t>
             </a:r>
-            <a:r>
-              <a:rPr lang="it-IT" sz="1400" dirty="0" smtClean="0">
-                <a:solidFill>
-                  <a:srgbClr val="92D050"/>
-                </a:solidFill>
-                <a:latin typeface="+mj-lt"/>
-              </a:rPr>
-              <a:t/>
-            </a:r>
             <a:br>
               <a:rPr lang="it-IT" sz="1400" dirty="0" smtClean="0">
                 <a:solidFill>
@@ -15921,15 +15509,6 @@
               </a:rPr>
               <a:t> { </a:t>
             </a:r>
-            <a:r>
-              <a:rPr lang="it-IT" sz="1400" dirty="0" smtClean="0">
-                <a:solidFill>
-                  <a:srgbClr val="92D050"/>
-                </a:solidFill>
-                <a:latin typeface="+mj-lt"/>
-              </a:rPr>
-              <a:t/>
-            </a:r>
             <a:br>
               <a:rPr lang="it-IT" sz="1400" dirty="0" smtClean="0">
                 <a:solidFill>
@@ -15954,7 +15533,16 @@
                 </a:solidFill>
                 <a:latin typeface="+mj-lt"/>
               </a:rPr>
-              <a:t>@</a:t>
+              <a:t>@Input</a:t>
+            </a:r>
+            <a:r>
+              <a:rPr lang="it-IT" sz="1400" dirty="0" smtClean="0">
+                <a:solidFill>
+                  <a:srgbClr val="92D050"/>
+                </a:solidFill>
+                <a:latin typeface="+mj-lt"/>
+              </a:rPr>
+              <a:t>() </a:t>
             </a:r>
             <a:r>
               <a:rPr lang="it-IT" sz="1400" dirty="0" err="1" smtClean="0">
@@ -15963,7 +15551,7 @@
                 </a:solidFill>
                 <a:latin typeface="+mj-lt"/>
               </a:rPr>
-              <a:t>Input</a:t>
+              <a:t>user</a:t>
             </a:r>
             <a:r>
               <a:rPr lang="it-IT" sz="1400" dirty="0" smtClean="0">
@@ -15972,7 +15560,7 @@
                 </a:solidFill>
                 <a:latin typeface="+mj-lt"/>
               </a:rPr>
-              <a:t>() </a:t>
+              <a:t>: { </a:t>
             </a:r>
             <a:r>
               <a:rPr lang="it-IT" sz="1400" dirty="0" err="1" smtClean="0">
@@ -15981,7 +15569,7 @@
                 </a:solidFill>
                 <a:latin typeface="+mj-lt"/>
               </a:rPr>
-              <a:t>user</a:t>
+              <a:t>name</a:t>
             </a:r>
             <a:r>
               <a:rPr lang="it-IT" sz="1400" dirty="0" smtClean="0">
@@ -15990,7 +15578,7 @@
                 </a:solidFill>
                 <a:latin typeface="+mj-lt"/>
               </a:rPr>
-              <a:t>: { </a:t>
+              <a:t>: </a:t>
             </a:r>
             <a:r>
               <a:rPr lang="it-IT" sz="1400" dirty="0" err="1" smtClean="0">
@@ -15999,7 +15587,7 @@
                 </a:solidFill>
                 <a:latin typeface="+mj-lt"/>
               </a:rPr>
-              <a:t>name</a:t>
+              <a:t>string</a:t>
             </a:r>
             <a:r>
               <a:rPr lang="it-IT" sz="1400" dirty="0" smtClean="0">
@@ -16008,6 +15596,24 @@
                 </a:solidFill>
                 <a:latin typeface="+mj-lt"/>
               </a:rPr>
+              <a:t>, </a:t>
+            </a:r>
+            <a:r>
+              <a:rPr lang="it-IT" sz="1400" dirty="0" err="1" smtClean="0">
+                <a:solidFill>
+                  <a:srgbClr val="92D050"/>
+                </a:solidFill>
+                <a:latin typeface="+mj-lt"/>
+              </a:rPr>
+              <a:t>age</a:t>
+            </a:r>
+            <a:r>
+              <a:rPr lang="it-IT" sz="1400" dirty="0" smtClean="0">
+                <a:solidFill>
+                  <a:srgbClr val="92D050"/>
+                </a:solidFill>
+                <a:latin typeface="+mj-lt"/>
+              </a:rPr>
               <a:t>: </a:t>
             </a:r>
             <a:r>
@@ -16017,7 +15623,7 @@
                 </a:solidFill>
                 <a:latin typeface="+mj-lt"/>
               </a:rPr>
-              <a:t>string</a:t>
+              <a:t>number</a:t>
             </a:r>
             <a:r>
               <a:rPr lang="it-IT" sz="1400" dirty="0" smtClean="0">
@@ -16026,52 +15632,7 @@
                 </a:solidFill>
                 <a:latin typeface="+mj-lt"/>
               </a:rPr>
-              <a:t>, </a:t>
-            </a:r>
-            <a:r>
-              <a:rPr lang="it-IT" sz="1400" dirty="0" err="1" smtClean="0">
-                <a:solidFill>
-                  <a:srgbClr val="92D050"/>
-                </a:solidFill>
-                <a:latin typeface="+mj-lt"/>
-              </a:rPr>
-              <a:t>age</a:t>
-            </a:r>
-            <a:r>
-              <a:rPr lang="it-IT" sz="1400" dirty="0" smtClean="0">
-                <a:solidFill>
-                  <a:srgbClr val="92D050"/>
-                </a:solidFill>
-                <a:latin typeface="+mj-lt"/>
-              </a:rPr>
-              <a:t>: </a:t>
-            </a:r>
-            <a:r>
-              <a:rPr lang="it-IT" sz="1400" dirty="0" err="1" smtClean="0">
-                <a:solidFill>
-                  <a:srgbClr val="92D050"/>
-                </a:solidFill>
-                <a:latin typeface="+mj-lt"/>
-              </a:rPr>
-              <a:t>number</a:t>
-            </a:r>
-            <a:r>
-              <a:rPr lang="it-IT" sz="1400" dirty="0" smtClean="0">
-                <a:solidFill>
-                  <a:srgbClr val="92D050"/>
-                </a:solidFill>
-                <a:latin typeface="+mj-lt"/>
-              </a:rPr>
               <a:t> }; </a:t>
-            </a:r>
-            <a:r>
-              <a:rPr lang="it-IT" sz="1400" dirty="0" smtClean="0">
-                <a:solidFill>
-                  <a:srgbClr val="92D050"/>
-                </a:solidFill>
-                <a:latin typeface="+mj-lt"/>
-              </a:rPr>
-              <a:t/>
             </a:r>
             <a:br>
               <a:rPr lang="it-IT" sz="1400" dirty="0" smtClean="0">
@@ -16090,12 +15651,6 @@
               </a:rPr>
               <a:t>}</a:t>
             </a:r>
-            <a:endParaRPr lang="it-IT" sz="1400" dirty="0" smtClean="0">
-              <a:solidFill>
-                <a:srgbClr val="92D050"/>
-              </a:solidFill>
-              <a:latin typeface="+mj-lt"/>
-            </a:endParaRPr>
           </a:p>
           <a:p>
             <a:pPr>
@@ -16126,7 +15681,16 @@
                 </a:solidFill>
                 <a:latin typeface="+mj-lt"/>
               </a:rPr>
-              <a:t> </a:t>
+              <a:t> Componente Padre </a:t>
+            </a:r>
+            <a:r>
+              <a:rPr lang="it-IT" sz="1400" dirty="0" err="1" smtClean="0">
+                <a:solidFill>
+                  <a:srgbClr val="92D050"/>
+                </a:solidFill>
+                <a:latin typeface="+mj-lt"/>
+              </a:rPr>
+              <a:t>--</a:t>
             </a:r>
             <a:r>
               <a:rPr lang="it-IT" sz="1400" dirty="0" smtClean="0">
@@ -16135,7 +15699,7 @@
                 </a:solidFill>
                 <a:latin typeface="+mj-lt"/>
               </a:rPr>
-              <a:t>Componente Padre </a:t>
+              <a:t>&gt; &lt;</a:t>
             </a:r>
             <a:r>
               <a:rPr lang="it-IT" sz="1400" dirty="0" err="1" smtClean="0">
@@ -16144,7 +15708,7 @@
                 </a:solidFill>
                 <a:latin typeface="+mj-lt"/>
               </a:rPr>
-              <a:t>--</a:t>
+              <a:t>app-child</a:t>
             </a:r>
             <a:r>
               <a:rPr lang="it-IT" sz="1400" dirty="0" smtClean="0">
@@ -16153,7 +15717,7 @@
                 </a:solidFill>
                 <a:latin typeface="+mj-lt"/>
               </a:rPr>
-              <a:t>&gt; &lt;</a:t>
+              <a:t> [</a:t>
             </a:r>
             <a:r>
               <a:rPr lang="it-IT" sz="1400" dirty="0" err="1" smtClean="0">
@@ -16162,6 +15726,42 @@
                 </a:solidFill>
                 <a:latin typeface="+mj-lt"/>
               </a:rPr>
+              <a:t>user</a:t>
+            </a:r>
+            <a:r>
+              <a:rPr lang="it-IT" sz="1400" dirty="0" smtClean="0">
+                <a:solidFill>
+                  <a:srgbClr val="92D050"/>
+                </a:solidFill>
+                <a:latin typeface="+mj-lt"/>
+              </a:rPr>
+              <a:t>]="</a:t>
+            </a:r>
+            <a:r>
+              <a:rPr lang="it-IT" sz="1400" dirty="0" err="1" smtClean="0">
+                <a:solidFill>
+                  <a:srgbClr val="92D050"/>
+                </a:solidFill>
+                <a:latin typeface="+mj-lt"/>
+              </a:rPr>
+              <a:t>parentUser</a:t>
+            </a:r>
+            <a:r>
+              <a:rPr lang="it-IT" sz="1400" dirty="0" smtClean="0">
+                <a:solidFill>
+                  <a:srgbClr val="92D050"/>
+                </a:solidFill>
+                <a:latin typeface="+mj-lt"/>
+              </a:rPr>
+              <a:t>"&gt;&lt;/</a:t>
+            </a:r>
+            <a:r>
+              <a:rPr lang="it-IT" sz="1400" dirty="0" err="1" smtClean="0">
+                <a:solidFill>
+                  <a:srgbClr val="92D050"/>
+                </a:solidFill>
+                <a:latin typeface="+mj-lt"/>
+              </a:rPr>
               <a:t>app-child</a:t>
             </a:r>
             <a:r>
@@ -16171,28 +15771,17 @@
                 </a:solidFill>
                 <a:latin typeface="+mj-lt"/>
               </a:rPr>
-              <a:t> [</a:t>
-            </a:r>
-            <a:r>
-              <a:rPr lang="it-IT" sz="1400" dirty="0" err="1" smtClean="0">
-                <a:solidFill>
-                  <a:srgbClr val="92D050"/>
-                </a:solidFill>
-                <a:latin typeface="+mj-lt"/>
-              </a:rPr>
-              <a:t>user</a:t>
-            </a:r>
-            <a:r>
-              <a:rPr lang="it-IT" sz="1400" dirty="0" smtClean="0">
-                <a:solidFill>
-                  <a:srgbClr val="92D050"/>
-                </a:solidFill>
-                <a:latin typeface="+mj-lt"/>
-              </a:rPr>
-              <a:t>]="</a:t>
-            </a:r>
-            <a:r>
-              <a:rPr lang="it-IT" sz="1400" dirty="0" err="1" smtClean="0">
+              <a:t>&gt;</a:t>
+            </a:r>
+          </a:p>
+          <a:p>
+            <a:pPr lvl="1"/>
+            <a:r>
+              <a:rPr lang="it-IT" dirty="0" smtClean="0"/>
+              <a:t>Se </a:t>
+            </a:r>
+            <a:r>
+              <a:rPr lang="it-IT" sz="2000" dirty="0" err="1" smtClean="0">
                 <a:solidFill>
                   <a:srgbClr val="92D050"/>
                 </a:solidFill>
@@ -16201,42 +15790,13 @@
               <a:t>parentUser</a:t>
             </a:r>
             <a:r>
-              <a:rPr lang="it-IT" sz="1400" dirty="0" smtClean="0">
-                <a:solidFill>
-                  <a:srgbClr val="92D050"/>
-                </a:solidFill>
-                <a:latin typeface="+mj-lt"/>
-              </a:rPr>
-              <a:t>"&gt;&lt;/</a:t>
-            </a:r>
-            <a:r>
-              <a:rPr lang="it-IT" sz="1400" dirty="0" err="1" smtClean="0">
-                <a:solidFill>
-                  <a:srgbClr val="92D050"/>
-                </a:solidFill>
-                <a:latin typeface="+mj-lt"/>
-              </a:rPr>
-              <a:t>app-child</a:t>
-            </a:r>
-            <a:r>
-              <a:rPr lang="it-IT" sz="1400" dirty="0" smtClean="0">
-                <a:solidFill>
-                  <a:srgbClr val="92D050"/>
-                </a:solidFill>
-                <a:latin typeface="+mj-lt"/>
-              </a:rPr>
-              <a:t>&gt;</a:t>
-            </a:r>
-          </a:p>
-          <a:p>
-            <a:pPr lvl="1"/>
-            <a:r>
-              <a:rPr lang="it-IT" dirty="0" smtClean="0"/>
-              <a:t>Se</a:t>
-            </a:r>
-            <a:r>
-              <a:rPr lang="it-IT" dirty="0" smtClean="0"/>
-              <a:t> </a:t>
+              <a:rPr lang="it-IT" sz="2000" dirty="0" smtClean="0">
+                <a:solidFill>
+                  <a:srgbClr val="92D050"/>
+                </a:solidFill>
+                <a:latin typeface="+mj-lt"/>
+              </a:rPr>
+              <a:t> = { </a:t>
             </a:r>
             <a:r>
               <a:rPr lang="it-IT" sz="2000" dirty="0" err="1" smtClean="0">
@@ -16245,7 +15805,7 @@
                 </a:solidFill>
                 <a:latin typeface="+mj-lt"/>
               </a:rPr>
-              <a:t>parentUser</a:t>
+              <a:t>name</a:t>
             </a:r>
             <a:r>
               <a:rPr lang="it-IT" sz="2000" dirty="0" smtClean="0">
@@ -16254,7 +15814,7 @@
                 </a:solidFill>
                 <a:latin typeface="+mj-lt"/>
               </a:rPr>
-              <a:t> = { </a:t>
+              <a:t>: 'Mario', </a:t>
             </a:r>
             <a:r>
               <a:rPr lang="it-IT" sz="2000" dirty="0" err="1" smtClean="0">
@@ -16263,7 +15823,7 @@
                 </a:solidFill>
                 <a:latin typeface="+mj-lt"/>
               </a:rPr>
-              <a:t>name</a:t>
+              <a:t>age</a:t>
             </a:r>
             <a:r>
               <a:rPr lang="it-IT" sz="2000" dirty="0" smtClean="0">
@@ -16272,31 +15832,12 @@
                 </a:solidFill>
                 <a:latin typeface="+mj-lt"/>
               </a:rPr>
-              <a:t>: 'Mario', </a:t>
-            </a:r>
-            <a:r>
-              <a:rPr lang="it-IT" sz="2000" dirty="0" err="1" smtClean="0">
-                <a:solidFill>
-                  <a:srgbClr val="92D050"/>
-                </a:solidFill>
-                <a:latin typeface="+mj-lt"/>
-              </a:rPr>
-              <a:t>age</a:t>
-            </a:r>
-            <a:r>
-              <a:rPr lang="it-IT" sz="2000" dirty="0" smtClean="0">
-                <a:solidFill>
-                  <a:srgbClr val="92D050"/>
-                </a:solidFill>
-                <a:latin typeface="+mj-lt"/>
-              </a:rPr>
               <a:t>: 30 }</a:t>
             </a:r>
             <a:r>
               <a:rPr lang="it-IT" dirty="0" smtClean="0"/>
               <a:t>, il risultato sarà: </a:t>
             </a:r>
-            <a:endParaRPr lang="it-IT" dirty="0" smtClean="0"/>
           </a:p>
           <a:p>
             <a:pPr lvl="1" algn="ctr">
@@ -16306,19 +15847,7 @@
               <a:rPr lang="it-IT" sz="1800" dirty="0" smtClean="0">
                 <a:latin typeface="+mj-lt"/>
               </a:rPr>
-              <a:t>&lt;</a:t>
-            </a:r>
-            <a:r>
-              <a:rPr lang="it-IT" sz="1800" dirty="0" smtClean="0">
-                <a:latin typeface="+mj-lt"/>
-              </a:rPr>
-              <a:t>p&gt;Mario ha 30 anni.&lt;/p</a:t>
-            </a:r>
-            <a:r>
-              <a:rPr lang="it-IT" sz="1800" dirty="0" smtClean="0">
-                <a:latin typeface="+mj-lt"/>
-              </a:rPr>
-              <a:t>&gt;</a:t>
+              <a:t>&lt;p&gt;Mario ha 30 anni.&lt;/p&gt;</a:t>
             </a:r>
             <a:endParaRPr lang="it-IT" dirty="0" smtClean="0">
               <a:latin typeface="+mj-lt"/>
@@ -16334,6 +15863,13 @@
   <p:clrMapOvr>
     <a:masterClrMapping/>
   </p:clrMapOvr>
+  <p:timing>
+    <p:tnLst>
+      <p:par>
+        <p:cTn id="1" dur="indefinite" restart="never" nodeType="tmRoot"/>
+      </p:par>
+    </p:tnLst>
+  </p:timing>
 </p:sld>
 </file>
 
@@ -16396,17 +15932,12 @@
               <a:rPr lang="it-IT" b="1" dirty="0" smtClean="0"/>
               <a:t> Output: </a:t>
             </a:r>
-            <a:endParaRPr lang="it-IT" b="1" dirty="0" smtClean="0"/>
           </a:p>
           <a:p>
             <a:pPr lvl="1"/>
             <a:r>
               <a:rPr lang="it-IT" b="1" dirty="0" smtClean="0"/>
-              <a:t>Invio </a:t>
-            </a:r>
-            <a:r>
-              <a:rPr lang="it-IT" b="1" dirty="0" smtClean="0"/>
-              <a:t>di Eventi da Figlio a Padre</a:t>
+              <a:t>Invio di Eventi da Figlio a Padre</a:t>
             </a:r>
             <a:endParaRPr lang="it-IT" dirty="0" smtClean="0"/>
           </a:p>
@@ -16415,17 +15946,12 @@
               <a:rPr lang="it-IT" dirty="0" smtClean="0"/>
               <a:t>Si utilizza </a:t>
             </a:r>
-            <a:endParaRPr lang="it-IT" dirty="0" smtClean="0"/>
           </a:p>
           <a:p>
             <a:pPr lvl="1"/>
             <a:r>
               <a:rPr lang="it-IT" dirty="0" smtClean="0"/>
-              <a:t>Il decoratore</a:t>
-            </a:r>
-            <a:r>
-              <a:rPr lang="it-IT" dirty="0" smtClean="0"/>
-              <a:t> </a:t>
+              <a:t>Il decoratore </a:t>
             </a:r>
             <a:r>
               <a:rPr lang="it-IT" dirty="0" err="1" smtClean="0">
@@ -16459,13 +15985,8 @@
             </a:r>
             <a:r>
               <a:rPr lang="it-IT" dirty="0" smtClean="0"/>
-              <a:t> per definire un </a:t>
-            </a:r>
-            <a:r>
-              <a:rPr lang="it-IT" dirty="0" smtClean="0"/>
-              <a:t>evento</a:t>
-            </a:r>
-            <a:endParaRPr lang="it-IT" dirty="0" smtClean="0"/>
+              <a:t> per definire un evento</a:t>
+            </a:r>
           </a:p>
           <a:p>
             <a:endParaRPr lang="it-IT" dirty="0"/>
@@ -16510,6 +16031,13 @@
   <p:clrMapOvr>
     <a:masterClrMapping/>
   </p:clrMapOvr>
+  <p:timing>
+    <p:tnLst>
+      <p:par>
+        <p:cTn id="1" dur="indefinite" restart="never" nodeType="tmRoot"/>
+      </p:par>
+    </p:tnLst>
+  </p:timing>
 </p:sld>
 </file>
 
@@ -16596,11 +16124,7 @@
             </a:r>
             <a:r>
               <a:rPr lang="it-IT" b="1" dirty="0" smtClean="0"/>
-              <a:t>per passare </a:t>
-            </a:r>
-            <a:r>
-              <a:rPr lang="it-IT" b="1" dirty="0" smtClean="0"/>
-              <a:t>dati</a:t>
+              <a:t>per passare dati</a:t>
             </a:r>
             <a:endParaRPr lang="it-IT" dirty="0" smtClean="0"/>
           </a:p>
@@ -16608,17 +16132,8 @@
             <a:pPr lvl="1"/>
             <a:r>
               <a:rPr lang="it-IT" dirty="0" smtClean="0"/>
-              <a:t>Mantieni </a:t>
-            </a:r>
-            <a:r>
-              <a:rPr lang="it-IT" dirty="0" smtClean="0"/>
-              <a:t>i componenti figli riutilizzabili e </a:t>
-            </a:r>
-            <a:r>
-              <a:rPr lang="it-IT" dirty="0" smtClean="0"/>
-              <a:t>modulari</a:t>
-            </a:r>
-            <a:endParaRPr lang="it-IT" dirty="0" smtClean="0"/>
+              <a:t>Mantieni i componenti figli riutilizzabili e modulari</a:t>
+            </a:r>
           </a:p>
           <a:p>
             <a:r>
@@ -16645,48 +16160,27 @@
             </a:r>
             <a:r>
               <a:rPr lang="it-IT" b="1" dirty="0" smtClean="0"/>
-              <a:t> per inviare </a:t>
-            </a:r>
+              <a:t> per inviare eventi</a:t>
+            </a:r>
+          </a:p>
+          <a:p>
+            <a:pPr lvl="1"/>
+            <a:r>
+              <a:rPr lang="it-IT" dirty="0" smtClean="0"/>
+              <a:t>Permette ai componenti figli di comunicare con i componenti padre</a:t>
+            </a:r>
+          </a:p>
+          <a:p>
             <a:r>
               <a:rPr lang="it-IT" b="1" dirty="0" smtClean="0"/>
-              <a:t>eventi</a:t>
+              <a:t>Evita logiche complesse nei componenti figli</a:t>
             </a:r>
           </a:p>
           <a:p>
             <a:pPr lvl="1"/>
             <a:r>
               <a:rPr lang="it-IT" dirty="0" smtClean="0"/>
-              <a:t>Permette </a:t>
-            </a:r>
-            <a:r>
-              <a:rPr lang="it-IT" dirty="0" smtClean="0"/>
-              <a:t>ai componenti figli di comunicare con i componenti </a:t>
-            </a:r>
-            <a:r>
-              <a:rPr lang="it-IT" dirty="0" smtClean="0"/>
-              <a:t>padre</a:t>
-            </a:r>
-            <a:endParaRPr lang="it-IT" dirty="0" smtClean="0"/>
-          </a:p>
-          <a:p>
-            <a:r>
-              <a:rPr lang="it-IT" b="1" dirty="0" smtClean="0"/>
-              <a:t>Evita logiche complesse nei componenti </a:t>
-            </a:r>
-            <a:r>
-              <a:rPr lang="it-IT" b="1" dirty="0" smtClean="0"/>
-              <a:t>figli</a:t>
-            </a:r>
-          </a:p>
-          <a:p>
-            <a:pPr lvl="1"/>
-            <a:r>
-              <a:rPr lang="it-IT" dirty="0" smtClean="0"/>
-              <a:t>I </a:t>
-            </a:r>
-            <a:r>
-              <a:rPr lang="it-IT" dirty="0" smtClean="0"/>
-              <a:t>componenti figli dovrebbero essere "stupidi" e ricevere dati tramite </a:t>
+              <a:t>I componenti figli dovrebbero essere "stupidi" e ricevere dati tramite </a:t>
             </a:r>
             <a:r>
               <a:rPr lang="it-IT" dirty="0" err="1" smtClean="0">
@@ -16720,6 +16214,13 @@
   <p:clrMapOvr>
     <a:masterClrMapping/>
   </p:clrMapOvr>
+  <p:timing>
+    <p:tnLst>
+      <p:par>
+        <p:cTn id="1" dur="indefinite" restart="never" nodeType="tmRoot"/>
+      </p:par>
+    </p:tnLst>
+  </p:timing>
 </p:sld>
 </file>
 
@@ -16971,6 +16472,13 @@
   <p:clrMapOvr>
     <a:masterClrMapping/>
   </p:clrMapOvr>
+  <p:timing>
+    <p:tnLst>
+      <p:par>
+        <p:cTn id="1" dur="indefinite" restart="never" nodeType="tmRoot"/>
+      </p:par>
+    </p:tnLst>
+  </p:timing>
 </p:sld>
 </file>
 
@@ -17041,28 +16549,14 @@
             </a:r>
             <a:r>
               <a:rPr lang="it-IT" dirty="0" smtClean="0"/>
-              <a:t> rappresenta le fasi attraverso cui un componente passa, dalla creazione alla </a:t>
-            </a:r>
-            <a:r>
-              <a:rPr lang="it-IT" dirty="0" smtClean="0"/>
-              <a:t>distruzione</a:t>
-            </a:r>
-            <a:endParaRPr lang="it-IT" dirty="0" smtClean="0"/>
-          </a:p>
-          <a:p>
-            <a:r>
-              <a:rPr lang="it-IT" dirty="0" smtClean="0"/>
-              <a:t>Permette </a:t>
-            </a:r>
-            <a:r>
-              <a:rPr lang="it-IT" dirty="0" smtClean="0"/>
-              <a:t>di eseguire logiche specifiche in momenti chiave del ciclo di vita, come l'inizializzazione, l'aggiornamento e la </a:t>
-            </a:r>
-            <a:r>
-              <a:rPr lang="it-IT" dirty="0" smtClean="0"/>
-              <a:t>distruzione</a:t>
-            </a:r>
-            <a:endParaRPr lang="it-IT" dirty="0" smtClean="0"/>
+              <a:t> rappresenta le fasi attraverso cui un componente passa, dalla creazione alla distruzione</a:t>
+            </a:r>
+          </a:p>
+          <a:p>
+            <a:r>
+              <a:rPr lang="it-IT" dirty="0" smtClean="0"/>
+              <a:t>Permette di eseguire logiche specifiche in momenti chiave del ciclo di vita, come l'inizializzazione, l'aggiornamento e la distruzione</a:t>
+            </a:r>
           </a:p>
           <a:p>
             <a:endParaRPr lang="it-IT" dirty="0"/>
@@ -17074,6 +16568,13 @@
   <p:clrMapOvr>
     <a:masterClrMapping/>
   </p:clrMapOvr>
+  <p:timing>
+    <p:tnLst>
+      <p:par>
+        <p:cTn id="1" dur="indefinite" restart="never" nodeType="tmRoot"/>
+      </p:par>
+    </p:tnLst>
+  </p:timing>
 </p:sld>
 </file>
 
@@ -17148,11 +16649,7 @@
             <a:pPr lvl="1"/>
             <a:r>
               <a:rPr lang="it-IT" dirty="0" smtClean="0"/>
-              <a:t>Metodi </a:t>
-            </a:r>
-            <a:r>
-              <a:rPr lang="it-IT" dirty="0" smtClean="0"/>
-              <a:t>speciali che </a:t>
+              <a:t>Metodi speciali che </a:t>
             </a:r>
             <a:r>
               <a:rPr lang="it-IT" dirty="0" err="1" smtClean="0"/>
@@ -17160,13 +16657,8 @@
             </a:r>
             <a:r>
               <a:rPr lang="it-IT" dirty="0" smtClean="0"/>
-              <a:t> chiama automaticamente in momenti specifici del ciclo di vita di un </a:t>
-            </a:r>
-            <a:r>
-              <a:rPr lang="it-IT" dirty="0" smtClean="0"/>
-              <a:t>componente</a:t>
-            </a:r>
-            <a:endParaRPr lang="it-IT" dirty="0" smtClean="0"/>
+              <a:t> chiama automaticamente in momenti specifici del ciclo di vita di un componente</a:t>
+            </a:r>
           </a:p>
           <a:p>
             <a:r>
@@ -17204,11 +16696,7 @@
             <a:pPr lvl="2"/>
             <a:r>
               <a:rPr lang="it-IT" dirty="0" smtClean="0"/>
-              <a:t>Chiamato </a:t>
-            </a:r>
-            <a:r>
-              <a:rPr lang="it-IT" dirty="0" smtClean="0"/>
-              <a:t>quando </a:t>
+              <a:t>Chiamato quando </a:t>
             </a:r>
             <a:r>
               <a:rPr lang="it-IT" dirty="0" err="1" smtClean="0"/>
@@ -17236,12 +16724,6 @@
               </a:rPr>
               <a:t>()</a:t>
             </a:r>
-            <a:endParaRPr lang="it-IT" dirty="0" smtClean="0">
-              <a:solidFill>
-                <a:srgbClr val="92D050"/>
-              </a:solidFill>
-              <a:latin typeface="+mj-lt"/>
-            </a:endParaRPr>
           </a:p>
           <a:p>
             <a:pPr lvl="1"/>
@@ -17265,11 +16747,7 @@
             <a:pPr lvl="2"/>
             <a:r>
               <a:rPr lang="it-IT" dirty="0" smtClean="0"/>
-              <a:t>Chiamato </a:t>
-            </a:r>
-            <a:r>
-              <a:rPr lang="it-IT" dirty="0" smtClean="0"/>
-              <a:t>una volta dopo che </a:t>
+              <a:t>Chiamato una volta dopo che </a:t>
             </a:r>
             <a:r>
               <a:rPr lang="it-IT" dirty="0" err="1" smtClean="0"/>
@@ -17302,11 +16780,7 @@
             <a:pPr lvl="2"/>
             <a:r>
               <a:rPr lang="it-IT" dirty="0" smtClean="0"/>
-              <a:t>Chiamato </a:t>
-            </a:r>
-            <a:r>
-              <a:rPr lang="it-IT" dirty="0" smtClean="0"/>
-              <a:t>durante ogni ciclo di </a:t>
+              <a:t>Chiamato durante ogni ciclo di </a:t>
             </a:r>
             <a:r>
               <a:rPr lang="it-IT" dirty="0" err="1" smtClean="0"/>
@@ -17314,13 +16788,8 @@
             </a:r>
             <a:r>
               <a:rPr lang="it-IT" dirty="0" smtClean="0"/>
-              <a:t> </a:t>
-            </a:r>
-            <a:r>
-              <a:rPr lang="it-IT" dirty="0" smtClean="0"/>
-              <a:t>detection</a:t>
-            </a:r>
-            <a:endParaRPr lang="it-IT" dirty="0" smtClean="0"/>
+              <a:t> detection</a:t>
+            </a:r>
           </a:p>
           <a:p>
             <a:pPr lvl="1"/>
@@ -17344,11 +16813,7 @@
             <a:pPr lvl="2"/>
             <a:r>
               <a:rPr lang="it-IT" dirty="0" smtClean="0"/>
-              <a:t>Chiamato </a:t>
-            </a:r>
-            <a:r>
-              <a:rPr lang="it-IT" dirty="0" smtClean="0"/>
-              <a:t>dopo che </a:t>
+              <a:t>Chiamato dopo che </a:t>
             </a:r>
             <a:r>
               <a:rPr lang="it-IT" dirty="0" err="1" smtClean="0"/>
@@ -17356,13 +16821,8 @@
             </a:r>
             <a:r>
               <a:rPr lang="it-IT" dirty="0" smtClean="0"/>
-              <a:t> ha proiettato contenuto esterno nel </a:t>
-            </a:r>
-            <a:r>
-              <a:rPr lang="it-IT" dirty="0" smtClean="0"/>
-              <a:t>componente</a:t>
-            </a:r>
-            <a:endParaRPr lang="it-IT" dirty="0" smtClean="0"/>
+              <a:t> ha proiettato contenuto esterno nel componente</a:t>
+            </a:r>
           </a:p>
           <a:p>
             <a:pPr lvl="1"/>
@@ -17380,17 +16840,8 @@
             <a:pPr lvl="2"/>
             <a:r>
               <a:rPr lang="it-IT" dirty="0" smtClean="0"/>
-              <a:t>Chiamato </a:t>
-            </a:r>
-            <a:r>
-              <a:rPr lang="it-IT" dirty="0" smtClean="0"/>
-              <a:t>dopo ogni verifica del contenuto </a:t>
-            </a:r>
-            <a:r>
-              <a:rPr lang="it-IT" dirty="0" smtClean="0"/>
-              <a:t>proiettato</a:t>
-            </a:r>
-            <a:endParaRPr lang="it-IT" dirty="0" smtClean="0"/>
+              <a:t>Chiamato dopo ogni verifica del contenuto proiettato</a:t>
+            </a:r>
           </a:p>
           <a:p>
             <a:pPr lvl="1"/>
@@ -17414,11 +16865,7 @@
             <a:pPr lvl="2"/>
             <a:r>
               <a:rPr lang="it-IT" dirty="0" smtClean="0"/>
-              <a:t>Chiamato </a:t>
-            </a:r>
-            <a:r>
-              <a:rPr lang="it-IT" dirty="0" smtClean="0"/>
-              <a:t>dopo che </a:t>
+              <a:t>Chiamato dopo che </a:t>
             </a:r>
             <a:r>
               <a:rPr lang="it-IT" dirty="0" err="1" smtClean="0"/>
@@ -17426,13 +16873,8 @@
             </a:r>
             <a:r>
               <a:rPr lang="it-IT" dirty="0" smtClean="0"/>
-              <a:t> ha inizializzato le viste del </a:t>
-            </a:r>
-            <a:r>
-              <a:rPr lang="it-IT" dirty="0" smtClean="0"/>
-              <a:t>componente</a:t>
-            </a:r>
-            <a:endParaRPr lang="it-IT" dirty="0" smtClean="0"/>
+              <a:t> ha inizializzato le viste del componente</a:t>
+            </a:r>
           </a:p>
           <a:p>
             <a:pPr lvl="1"/>
@@ -17456,17 +16898,8 @@
             <a:pPr lvl="2"/>
             <a:r>
               <a:rPr lang="it-IT" dirty="0" smtClean="0"/>
-              <a:t>Chiamato </a:t>
-            </a:r>
-            <a:r>
-              <a:rPr lang="it-IT" dirty="0" smtClean="0"/>
-              <a:t>dopo ogni verifica delle viste del </a:t>
-            </a:r>
-            <a:r>
-              <a:rPr lang="it-IT" dirty="0" smtClean="0"/>
-              <a:t>componente</a:t>
-            </a:r>
-            <a:endParaRPr lang="it-IT" dirty="0" smtClean="0"/>
+              <a:t>Chiamato dopo ogni verifica delle viste del componente</a:t>
+            </a:r>
           </a:p>
           <a:p>
             <a:pPr lvl="1"/>
@@ -17490,11 +16923,7 @@
             <a:pPr lvl="2"/>
             <a:r>
               <a:rPr lang="it-IT" dirty="0" smtClean="0"/>
-              <a:t>Chiamato </a:t>
-            </a:r>
-            <a:r>
-              <a:rPr lang="it-IT" dirty="0" smtClean="0"/>
-              <a:t>prima che </a:t>
+              <a:t>Chiamato prima che </a:t>
             </a:r>
             <a:r>
               <a:rPr lang="it-IT" dirty="0" err="1" smtClean="0"/>
@@ -17502,15 +16931,7 @@
             </a:r>
             <a:r>
               <a:rPr lang="it-IT" dirty="0" smtClean="0"/>
-              <a:t> distrugga il componente</a:t>
-            </a:r>
-            <a:r>
-              <a:rPr lang="it-IT" dirty="0" smtClean="0"/>
-              <a:t>.</a:t>
-            </a:r>
-            <a:r>
-              <a:rPr lang="it-IT" dirty="0" smtClean="0"/>
-              <a:t/>
+              <a:t> distrugga il componente.</a:t>
             </a:r>
             <a:br>
               <a:rPr lang="it-IT" dirty="0" smtClean="0"/>
@@ -17524,6 +16945,13 @@
   <p:clrMapOvr>
     <a:masterClrMapping/>
   </p:clrMapOvr>
+  <p:timing>
+    <p:tnLst>
+      <p:par>
+        <p:cTn id="1" dur="indefinite" restart="never" nodeType="tmRoot"/>
+      </p:par>
+    </p:tnLst>
+  </p:timing>
 </p:sld>
 </file>
 
@@ -17616,23 +17044,13 @@
               <a:rPr lang="it-IT" dirty="0" smtClean="0"/>
               <a:t> </a:t>
             </a:r>
-            <a:endParaRPr lang="it-IT" dirty="0" smtClean="0"/>
           </a:p>
           <a:p>
             <a:pPr lvl="1"/>
             <a:r>
               <a:rPr lang="it-IT" dirty="0" smtClean="0"/>
-              <a:t>permettono </a:t>
-            </a:r>
-            <a:r>
-              <a:rPr lang="it-IT" dirty="0" smtClean="0"/>
-              <a:t>di accedere a elementi del DOM o a componenti figli direttamente dalla classe del </a:t>
-            </a:r>
-            <a:r>
-              <a:rPr lang="it-IT" dirty="0" smtClean="0"/>
-              <a:t>componente</a:t>
-            </a:r>
-            <a:endParaRPr lang="it-IT" dirty="0" smtClean="0"/>
+              <a:t>permettono di accedere a elementi del DOM o a componenti figli direttamente dalla classe del componente</a:t>
+            </a:r>
           </a:p>
           <a:p>
             <a:r>
@@ -17643,17 +17061,12 @@
               <a:rPr lang="it-IT" dirty="0" smtClean="0"/>
               <a:t>: </a:t>
             </a:r>
-            <a:endParaRPr lang="it-IT" dirty="0" smtClean="0"/>
           </a:p>
           <a:p>
             <a:pPr lvl="1"/>
             <a:r>
               <a:rPr lang="it-IT" dirty="0" smtClean="0"/>
-              <a:t>Interagire </a:t>
-            </a:r>
-            <a:r>
-              <a:rPr lang="it-IT" dirty="0" smtClean="0"/>
-              <a:t>con elementi specifici del </a:t>
+              <a:t>Interagire con elementi specifici del </a:t>
             </a:r>
             <a:r>
               <a:rPr lang="it-IT" dirty="0" err="1" smtClean="0"/>
@@ -17661,13 +17074,8 @@
             </a:r>
             <a:r>
               <a:rPr lang="it-IT" dirty="0" smtClean="0"/>
-              <a:t> o con componenti figli per manipolarli o ottenere </a:t>
-            </a:r>
-            <a:r>
-              <a:rPr lang="it-IT" dirty="0" smtClean="0"/>
-              <a:t>dati</a:t>
-            </a:r>
-            <a:endParaRPr lang="it-IT" dirty="0" smtClean="0"/>
+              <a:t> o con componenti figli per manipolarli o ottenere dati</a:t>
+            </a:r>
           </a:p>
           <a:p>
             <a:endParaRPr lang="it-IT" dirty="0"/>
@@ -17679,6 +17087,13 @@
   <p:clrMapOvr>
     <a:masterClrMapping/>
   </p:clrMapOvr>
+  <p:timing>
+    <p:tnLst>
+      <p:par>
+        <p:cTn id="1" dur="indefinite" restart="never" nodeType="tmRoot"/>
+      </p:par>
+    </p:tnLst>
+  </p:timing>
 </p:sld>
 </file>
 
@@ -17741,11 +17156,7 @@
           <a:p>
             <a:r>
               <a:rPr lang="it-IT" dirty="0" smtClean="0"/>
-              <a:t>Permette </a:t>
-            </a:r>
-            <a:r>
-              <a:rPr lang="it-IT" dirty="0" smtClean="0"/>
-              <a:t>di accedere a un elemento del DOM o a un componente figlio definito nel </a:t>
+              <a:t>Permette di accedere a un elemento del DOM o a un componente figlio definito nel </a:t>
             </a:r>
             <a:r>
               <a:rPr lang="it-IT" dirty="0" err="1" smtClean="0"/>
@@ -17753,13 +17164,8 @@
             </a:r>
             <a:r>
               <a:rPr lang="it-IT" dirty="0" smtClean="0"/>
-              <a:t> del componente </a:t>
-            </a:r>
-            <a:r>
-              <a:rPr lang="it-IT" dirty="0" smtClean="0"/>
-              <a:t>corrente</a:t>
-            </a:r>
-            <a:endParaRPr lang="it-IT" dirty="0" smtClean="0"/>
+              <a:t> del componente corrente</a:t>
+            </a:r>
           </a:p>
           <a:p>
             <a:pPr>
@@ -17772,16 +17178,7 @@
                 </a:solidFill>
                 <a:latin typeface="+mj-lt"/>
               </a:rPr>
-              <a:t>@</a:t>
-            </a:r>
-            <a:r>
-              <a:rPr lang="it-IT" sz="2600" dirty="0" err="1" smtClean="0">
-                <a:solidFill>
-                  <a:srgbClr val="92D050"/>
-                </a:solidFill>
-                <a:latin typeface="+mj-lt"/>
-              </a:rPr>
-              <a:t>ViewChild</a:t>
+              <a:t>@ViewChild</a:t>
             </a:r>
             <a:r>
               <a:rPr lang="it-IT" sz="2600" dirty="0" smtClean="0">
@@ -17855,11 +17252,7 @@
             <a:pPr lvl="1"/>
             <a:r>
               <a:rPr lang="it-IT" dirty="0" smtClean="0"/>
-              <a:t>Può </a:t>
-            </a:r>
-            <a:r>
-              <a:rPr lang="it-IT" dirty="0" smtClean="0"/>
-              <a:t>essere un riferimento a un elemento del DOM (</a:t>
+              <a:t>Può essere un riferimento a un elemento del DOM (</a:t>
             </a:r>
             <a:r>
               <a:rPr lang="it-IT" dirty="0" err="1" smtClean="0">
@@ -17874,17 +17267,12 @@
               <a:rPr lang="it-IT" dirty="0" smtClean="0"/>
               <a:t>), </a:t>
             </a:r>
-            <a:endParaRPr lang="it-IT" dirty="0" smtClean="0"/>
           </a:p>
           <a:p>
             <a:pPr lvl="1"/>
             <a:r>
               <a:rPr lang="it-IT" dirty="0" smtClean="0"/>
-              <a:t>un </a:t>
-            </a:r>
-            <a:r>
-              <a:rPr lang="it-IT" dirty="0" smtClean="0"/>
-              <a:t>componente figlio </a:t>
+              <a:t>un componente figlio </a:t>
             </a:r>
           </a:p>
           <a:p>
@@ -17892,10 +17280,6 @@
             <a:r>
               <a:rPr lang="it-IT" dirty="0" smtClean="0"/>
               <a:t>una direttiva</a:t>
-            </a:r>
-            <a:r>
-              <a:rPr lang="it-IT" dirty="0" smtClean="0"/>
-              <a:t/>
             </a:r>
             <a:br>
               <a:rPr lang="it-IT" dirty="0" smtClean="0"/>
@@ -17909,6 +17293,13 @@
   <p:clrMapOvr>
     <a:masterClrMapping/>
   </p:clrMapOvr>
+  <p:timing>
+    <p:tnLst>
+      <p:par>
+        <p:cTn id="1" dur="indefinite" restart="never" nodeType="tmRoot"/>
+      </p:par>
+    </p:tnLst>
+  </p:timing>
 </p:sld>
 </file>
 
@@ -17981,13 +17372,8 @@
             </a:r>
             <a:r>
               <a:rPr lang="it-IT" dirty="0" smtClean="0"/>
-              <a:t> del componente </a:t>
-            </a:r>
-            <a:r>
-              <a:rPr lang="it-IT" dirty="0" smtClean="0"/>
-              <a:t>corrente</a:t>
-            </a:r>
-            <a:endParaRPr lang="it-IT" dirty="0" smtClean="0"/>
+              <a:t> del componente corrente</a:t>
+            </a:r>
           </a:p>
           <a:p>
             <a:r>
@@ -18001,16 +17387,7 @@
                 </a:solidFill>
                 <a:latin typeface="+mj-lt"/>
               </a:rPr>
-              <a:t>@</a:t>
-            </a:r>
-            <a:r>
-              <a:rPr lang="it-IT" dirty="0" err="1" smtClean="0">
-                <a:solidFill>
-                  <a:srgbClr val="92D050"/>
-                </a:solidFill>
-                <a:latin typeface="+mj-lt"/>
-              </a:rPr>
-              <a:t>ViewChild</a:t>
+              <a:t>@ViewChild</a:t>
             </a:r>
             <a:endParaRPr lang="it-IT" dirty="0">
               <a:solidFill>
@@ -18059,6 +17436,13 @@
   <p:clrMapOvr>
     <a:masterClrMapping/>
   </p:clrMapOvr>
+  <p:timing>
+    <p:tnLst>
+      <p:par>
+        <p:cTn id="1" dur="indefinite" restart="never" nodeType="tmRoot"/>
+      </p:par>
+    </p:tnLst>
+  </p:timing>
 </p:sld>
 </file>
 
@@ -18154,6 +17538,13 @@
   <p:clrMapOvr>
     <a:masterClrMapping/>
   </p:clrMapOvr>
+  <p:timing>
+    <p:tnLst>
+      <p:par>
+        <p:cTn id="1" dur="indefinite" restart="never" nodeType="tmRoot"/>
+      </p:par>
+    </p:tnLst>
+  </p:timing>
 </p:sld>
 </file>
 
@@ -18241,6 +17632,13 @@
   <p:clrMapOvr>
     <a:masterClrMapping/>
   </p:clrMapOvr>
+  <p:timing>
+    <p:tnLst>
+      <p:par>
+        <p:cTn id="1" dur="indefinite" restart="never" nodeType="tmRoot"/>
+      </p:par>
+    </p:tnLst>
+  </p:timing>
 </p:sld>
 </file>
 
@@ -18301,15 +17699,7 @@
           <a:p>
             <a:r>
               <a:rPr lang="it-IT" dirty="0" smtClean="0"/>
-              <a:t>Permette </a:t>
-            </a:r>
-            <a:r>
-              <a:rPr lang="it-IT" dirty="0" smtClean="0"/>
-              <a:t>di accedere a un elemento del DOM o a un componente figlio proiettato nel componente corrente tramite </a:t>
-            </a:r>
-            <a:r>
-              <a:rPr lang="it-IT" dirty="0" smtClean="0"/>
-              <a:t/>
+              <a:t>Permette di accedere a un elemento del DOM o a un componente figlio proiettato nel componente corrente tramite </a:t>
             </a:r>
             <a:br>
               <a:rPr lang="it-IT" dirty="0" smtClean="0"/>
@@ -18341,12 +17731,6 @@
               </a:rPr>
               <a:t>&gt;</a:t>
             </a:r>
-            <a:endParaRPr lang="it-IT" dirty="0" smtClean="0">
-              <a:solidFill>
-                <a:srgbClr val="92D050"/>
-              </a:solidFill>
-              <a:latin typeface="+mj-lt"/>
-            </a:endParaRPr>
           </a:p>
           <a:p>
             <a:pPr>
@@ -18359,16 +17743,7 @@
                 </a:solidFill>
                 <a:latin typeface="+mj-lt"/>
               </a:rPr>
-              <a:t>@</a:t>
-            </a:r>
-            <a:r>
-              <a:rPr lang="it-IT" sz="2400" dirty="0" err="1" smtClean="0">
-                <a:solidFill>
-                  <a:srgbClr val="92D050"/>
-                </a:solidFill>
-                <a:latin typeface="+mj-lt"/>
-              </a:rPr>
-              <a:t>ContentChild</a:t>
+              <a:t>@ContentChild</a:t>
             </a:r>
             <a:r>
               <a:rPr lang="it-IT" sz="2400" dirty="0" smtClean="0">
@@ -18446,11 +17821,7 @@
             </a:r>
             <a:r>
               <a:rPr lang="it-IT" dirty="0" smtClean="0"/>
-              <a:t>), un componente figlio o una </a:t>
-            </a:r>
-            <a:r>
-              <a:rPr lang="it-IT" dirty="0" smtClean="0"/>
-              <a:t>direttiva</a:t>
+              <a:t>), un componente figlio o una direttiva</a:t>
             </a:r>
             <a:endParaRPr lang="it-IT" dirty="0"/>
           </a:p>
@@ -18461,6 +17832,13 @@
   <p:clrMapOvr>
     <a:masterClrMapping/>
   </p:clrMapOvr>
+  <p:timing>
+    <p:tnLst>
+      <p:par>
+        <p:cTn id="1" dur="indefinite" restart="never" nodeType="tmRoot"/>
+      </p:par>
+    </p:tnLst>
+  </p:timing>
 </p:sld>
 </file>
 
@@ -18544,6 +17922,13 @@
   <p:clrMapOvr>
     <a:masterClrMapping/>
   </p:clrMapOvr>
+  <p:timing>
+    <p:tnLst>
+      <p:par>
+        <p:cTn id="1" dur="indefinite" restart="never" nodeType="tmRoot"/>
+      </p:par>
+    </p:tnLst>
+  </p:timing>
 </p:sld>
 </file>
 
@@ -18652,13 +18037,8 @@
             </a:r>
             <a:r>
               <a:rPr lang="it-IT" dirty="0" smtClean="0"/>
-              <a:t> del componente </a:t>
-            </a:r>
-            <a:r>
-              <a:rPr lang="it-IT" dirty="0" smtClean="0"/>
-              <a:t>corrente</a:t>
-            </a:r>
-            <a:endParaRPr lang="it-IT" dirty="0" smtClean="0"/>
+              <a:t> del componente corrente</a:t>
+            </a:r>
           </a:p>
           <a:p>
             <a:pPr lvl="1"/>
@@ -18725,6 +18105,22 @@
               </a:rPr>
               <a:t>&gt;</a:t>
             </a:r>
+          </a:p>
+          <a:p>
+            <a:pPr lvl="1"/>
+            <a:r>
+              <a:rPr lang="it-IT" dirty="0" smtClean="0"/>
+              <a:t>Disponibile dopo </a:t>
+            </a:r>
+            <a:r>
+              <a:rPr lang="it-IT" dirty="0" err="1" smtClean="0">
+                <a:solidFill>
+                  <a:srgbClr val="92D050"/>
+                </a:solidFill>
+                <a:latin typeface="+mj-lt"/>
+              </a:rPr>
+              <a:t>ngAfterContentInit</a:t>
+            </a:r>
             <a:endParaRPr lang="it-IT" dirty="0" smtClean="0">
               <a:solidFill>
                 <a:srgbClr val="92D050"/>
@@ -18733,28 +18129,6 @@
             </a:endParaRPr>
           </a:p>
           <a:p>
-            <a:pPr lvl="1"/>
-            <a:r>
-              <a:rPr lang="it-IT" dirty="0" smtClean="0"/>
-              <a:t>Disponibile dopo </a:t>
-            </a:r>
-            <a:r>
-              <a:rPr lang="it-IT" dirty="0" err="1" smtClean="0">
-                <a:solidFill>
-                  <a:srgbClr val="92D050"/>
-                </a:solidFill>
-                <a:latin typeface="+mj-lt"/>
-              </a:rPr>
-              <a:t>ngAfterContentInit</a:t>
-            </a:r>
-            <a:endParaRPr lang="it-IT" dirty="0" smtClean="0">
-              <a:solidFill>
-                <a:srgbClr val="92D050"/>
-              </a:solidFill>
-              <a:latin typeface="+mj-lt"/>
-            </a:endParaRPr>
-          </a:p>
-          <a:p>
             <a:r>
               <a:rPr lang="it-IT" dirty="0" smtClean="0"/>
               <a:t/>
@@ -18771,6 +18145,13 @@
   <p:clrMapOvr>
     <a:masterClrMapping/>
   </p:clrMapOvr>
+  <p:timing>
+    <p:tnLst>
+      <p:par>
+        <p:cTn id="1" dur="indefinite" restart="never" nodeType="tmRoot"/>
+      </p:par>
+    </p:tnLst>
+  </p:timing>
 </p:sld>
 </file>
 
@@ -19046,6 +18427,13 @@
   <p:clrMapOvr>
     <a:masterClrMapping/>
   </p:clrMapOvr>
+  <p:timing>
+    <p:tnLst>
+      <p:par>
+        <p:cTn id="1" dur="indefinite" restart="never" nodeType="tmRoot"/>
+      </p:par>
+    </p:tnLst>
+  </p:timing>
 </p:sld>
 </file>
 
@@ -19192,21 +18580,12 @@
               <a:rPr lang="it-IT" dirty="0" smtClean="0"/>
               <a:t>: </a:t>
             </a:r>
-            <a:endParaRPr lang="it-IT" dirty="0" smtClean="0"/>
           </a:p>
           <a:p>
             <a:pPr lvl="1"/>
             <a:r>
               <a:rPr lang="it-IT" dirty="0" smtClean="0"/>
-              <a:t>Usa</a:t>
-            </a:r>
-            <a:r>
-              <a:rPr lang="it-IT" dirty="0" smtClean="0"/>
-              <a:t> Renderer2 per operazioni sul </a:t>
-            </a:r>
-            <a:r>
-              <a:rPr lang="it-IT" dirty="0" smtClean="0"/>
-              <a:t>DOM</a:t>
+              <a:t>Usa Renderer2 per operazioni sul DOM</a:t>
             </a:r>
             <a:endParaRPr lang="it-IT" dirty="0"/>
           </a:p>
@@ -19217,6 +18596,13 @@
   <p:clrMapOvr>
     <a:masterClrMapping/>
   </p:clrMapOvr>
+  <p:timing>
+    <p:tnLst>
+      <p:par>
+        <p:cTn id="1" dur="indefinite" restart="never" nodeType="tmRoot"/>
+      </p:par>
+    </p:tnLst>
+  </p:timing>
 </p:sld>
 </file>
 
@@ -19413,6 +18799,13 @@
   <p:clrMapOvr>
     <a:masterClrMapping/>
   </p:clrMapOvr>
+  <p:timing>
+    <p:tnLst>
+      <p:par>
+        <p:cTn id="1" dur="indefinite" restart="never" nodeType="tmRoot"/>
+      </p:par>
+    </p:tnLst>
+  </p:timing>
 </p:sld>
 </file>
 
@@ -19480,6 +18873,13 @@
   <p:clrMapOvr>
     <a:masterClrMapping/>
   </p:clrMapOvr>
+  <p:timing>
+    <p:tnLst>
+      <p:par>
+        <p:cTn id="1" dur="indefinite" restart="never" nodeType="tmRoot"/>
+      </p:par>
+    </p:tnLst>
+  </p:timing>
 </p:sld>
 </file>
 
@@ -19606,6 +19006,13 @@
   <p:clrMapOvr>
     <a:masterClrMapping/>
   </p:clrMapOvr>
+  <p:timing>
+    <p:tnLst>
+      <p:par>
+        <p:cTn id="1" dur="indefinite" restart="never" nodeType="tmRoot"/>
+      </p:par>
+    </p:tnLst>
+  </p:timing>
 </p:sld>
 </file>
 
@@ -19826,16 +19233,7 @@
                 </a:solidFill>
                 <a:latin typeface="+mj-lt"/>
               </a:rPr>
-              <a:t>	</a:t>
-            </a:r>
-            <a:r>
-              <a:rPr lang="it-IT" sz="2000" dirty="0" smtClean="0">
-                <a:solidFill>
-                  <a:srgbClr val="92D050"/>
-                </a:solidFill>
-                <a:latin typeface="+mj-lt"/>
-              </a:rPr>
-              <a:t>&lt;</a:t>
+              <a:t>	&lt;</a:t>
             </a:r>
             <a:r>
               <a:rPr lang="it-IT" sz="2000" dirty="0" err="1">
@@ -20042,6 +19440,13 @@
   <p:clrMapOvr>
     <a:masterClrMapping/>
   </p:clrMapOvr>
+  <p:timing>
+    <p:tnLst>
+      <p:par>
+        <p:cTn id="1" dur="indefinite" restart="never" nodeType="tmRoot"/>
+      </p:par>
+    </p:tnLst>
+  </p:timing>
 </p:sld>
 </file>
 
@@ -20333,6 +19738,13 @@
   <p:clrMapOvr>
     <a:masterClrMapping/>
   </p:clrMapOvr>
+  <p:timing>
+    <p:tnLst>
+      <p:par>
+        <p:cTn id="1" dur="indefinite" restart="never" nodeType="tmRoot"/>
+      </p:par>
+    </p:tnLst>
+  </p:timing>
 </p:sld>
 </file>
 
@@ -20449,6 +19861,13 @@
   <p:clrMapOvr>
     <a:masterClrMapping/>
   </p:clrMapOvr>
+  <p:timing>
+    <p:tnLst>
+      <p:par>
+        <p:cTn id="1" dur="indefinite" restart="never" nodeType="tmRoot"/>
+      </p:par>
+    </p:tnLst>
+  </p:timing>
 </p:sld>
 </file>
 
@@ -20516,6 +19935,13 @@
   <p:clrMapOvr>
     <a:masterClrMapping/>
   </p:clrMapOvr>
+  <p:timing>
+    <p:tnLst>
+      <p:par>
+        <p:cTn id="1" dur="indefinite" restart="never" nodeType="tmRoot"/>
+      </p:par>
+    </p:tnLst>
+  </p:timing>
 </p:sld>
 </file>
 
@@ -20705,6 +20131,13 @@
   <p:clrMapOvr>
     <a:masterClrMapping/>
   </p:clrMapOvr>
+  <p:timing>
+    <p:tnLst>
+      <p:par>
+        <p:cTn id="1" dur="indefinite" restart="never" nodeType="tmRoot"/>
+      </p:par>
+    </p:tnLst>
+  </p:timing>
 </p:sld>
 </file>
 
@@ -20821,6 +20254,13 @@
   <p:clrMapOvr>
     <a:masterClrMapping/>
   </p:clrMapOvr>
+  <p:timing>
+    <p:tnLst>
+      <p:par>
+        <p:cTn id="1" dur="indefinite" restart="never" nodeType="tmRoot"/>
+      </p:par>
+    </p:tnLst>
+  </p:timing>
 </p:sld>
 </file>
 
@@ -21110,6 +20550,13 @@
   <p:clrMapOvr>
     <a:masterClrMapping/>
   </p:clrMapOvr>
+  <p:timing>
+    <p:tnLst>
+      <p:par>
+        <p:cTn id="1" dur="indefinite" restart="never" nodeType="tmRoot"/>
+      </p:par>
+    </p:tnLst>
+  </p:timing>
 </p:sld>
 </file>
 
@@ -21185,6 +20632,13 @@
   <p:clrMapOvr>
     <a:masterClrMapping/>
   </p:clrMapOvr>
+  <p:timing>
+    <p:tnLst>
+      <p:par>
+        <p:cTn id="1" dur="indefinite" restart="never" nodeType="tmRoot"/>
+      </p:par>
+    </p:tnLst>
+  </p:timing>
 </p:sld>
 </file>
 
@@ -21374,6 +20828,13 @@
   <p:clrMapOvr>
     <a:masterClrMapping/>
   </p:clrMapOvr>
+  <p:timing>
+    <p:tnLst>
+      <p:par>
+        <p:cTn id="1" dur="indefinite" restart="never" nodeType="tmRoot"/>
+      </p:par>
+    </p:tnLst>
+  </p:timing>
 </p:sld>
 </file>
 
@@ -22254,6 +21715,13 @@
   <p:clrMapOvr>
     <a:masterClrMapping/>
   </p:clrMapOvr>
+  <p:timing>
+    <p:tnLst>
+      <p:par>
+        <p:cTn id="1" dur="indefinite" restart="never" nodeType="tmRoot"/>
+      </p:par>
+    </p:tnLst>
+  </p:timing>
 </p:sld>
 </file>
 
@@ -22550,7 +22018,6 @@
               <a:rPr lang="it-IT" dirty="0" smtClean="0"/>
               <a:t>Stato globale</a:t>
             </a:r>
-            <a:endParaRPr lang="it-IT" dirty="0" smtClean="0"/>
           </a:p>
           <a:p>
             <a:pPr lvl="1"/>
@@ -22572,17 +22039,8 @@
             <a:pPr lvl="2"/>
             <a:r>
               <a:rPr lang="it-IT" dirty="0" smtClean="0"/>
-              <a:t>Eventi </a:t>
-            </a:r>
-            <a:r>
-              <a:rPr lang="it-IT" dirty="0" smtClean="0"/>
-              <a:t>che modificano lo </a:t>
-            </a:r>
-            <a:r>
-              <a:rPr lang="it-IT" dirty="0" smtClean="0"/>
-              <a:t>stato</a:t>
-            </a:r>
-            <a:endParaRPr lang="it-IT" dirty="0" smtClean="0"/>
+              <a:t>Eventi che modificano lo stato</a:t>
+            </a:r>
           </a:p>
           <a:p>
             <a:pPr lvl="1"/>
@@ -22604,17 +22062,8 @@
             <a:pPr lvl="2"/>
             <a:r>
               <a:rPr lang="it-IT" dirty="0" smtClean="0"/>
-              <a:t>Funzioni </a:t>
-            </a:r>
-            <a:r>
-              <a:rPr lang="it-IT" dirty="0" smtClean="0"/>
-              <a:t>che gestiscono le </a:t>
-            </a:r>
-            <a:r>
-              <a:rPr lang="it-IT" dirty="0" smtClean="0"/>
-              <a:t>azioni</a:t>
-            </a:r>
-            <a:endParaRPr lang="it-IT" dirty="0" smtClean="0"/>
+              <a:t>Funzioni che gestiscono le azioni</a:t>
+            </a:r>
           </a:p>
           <a:p>
             <a:pPr lvl="1"/>
@@ -22636,11 +22085,7 @@
             <a:pPr lvl="2"/>
             <a:r>
               <a:rPr lang="it-IT" dirty="0" smtClean="0"/>
-              <a:t>Gestione </a:t>
-            </a:r>
-            <a:r>
-              <a:rPr lang="it-IT" dirty="0" smtClean="0"/>
-              <a:t>di side </a:t>
+              <a:t>Gestione di side </a:t>
             </a:r>
             <a:r>
               <a:rPr lang="it-IT" dirty="0" err="1" smtClean="0"/>
@@ -22648,13 +22093,8 @@
             </a:r>
             <a:r>
               <a:rPr lang="it-IT" dirty="0" smtClean="0"/>
-              <a:t> (es. chiamate HTTP</a:t>
-            </a:r>
-            <a:r>
-              <a:rPr lang="it-IT" dirty="0" smtClean="0"/>
-              <a:t>)</a:t>
-            </a:r>
-            <a:endParaRPr lang="it-IT" dirty="0" smtClean="0"/>
+              <a:t> (es. chiamate HTTP)</a:t>
+            </a:r>
           </a:p>
           <a:p>
             <a:endParaRPr lang="it-IT" dirty="0"/>
@@ -23335,6 +22775,13 @@
   <p:clrMapOvr>
     <a:masterClrMapping/>
   </p:clrMapOvr>
+  <p:timing>
+    <p:tnLst>
+      <p:par>
+        <p:cTn id="1" dur="indefinite" restart="never" nodeType="tmRoot"/>
+      </p:par>
+    </p:tnLst>
+  </p:timing>
 </p:sld>
 </file>
 

</xml_diff>